<commit_message>
some comments are added
</commit_message>
<xml_diff>
--- a/presentation/cinco_presentation.pptx
+++ b/presentation/cinco_presentation.pptx
@@ -5,10 +5,10 @@
     <p:sldMasterId id="2147483696" r:id="rId2"/>
   </p:sldMasterIdLst>
   <p:notesMasterIdLst>
-    <p:notesMasterId r:id="rId41"/>
+    <p:notesMasterId r:id="rId40"/>
   </p:notesMasterIdLst>
   <p:handoutMasterIdLst>
-    <p:handoutMasterId r:id="rId42"/>
+    <p:handoutMasterId r:id="rId41"/>
   </p:handoutMasterIdLst>
   <p:sldIdLst>
     <p:sldId id="257" r:id="rId3"/>
@@ -21,34 +21,33 @@
     <p:sldId id="276" r:id="rId10"/>
     <p:sldId id="274" r:id="rId11"/>
     <p:sldId id="275" r:id="rId12"/>
-    <p:sldId id="277" r:id="rId13"/>
-    <p:sldId id="280" r:id="rId14"/>
-    <p:sldId id="281" r:id="rId15"/>
-    <p:sldId id="282" r:id="rId16"/>
-    <p:sldId id="283" r:id="rId17"/>
-    <p:sldId id="284" r:id="rId18"/>
-    <p:sldId id="285" r:id="rId19"/>
-    <p:sldId id="286" r:id="rId20"/>
-    <p:sldId id="287" r:id="rId21"/>
-    <p:sldId id="288" r:id="rId22"/>
-    <p:sldId id="289" r:id="rId23"/>
-    <p:sldId id="290" r:id="rId24"/>
-    <p:sldId id="291" r:id="rId25"/>
-    <p:sldId id="292" r:id="rId26"/>
-    <p:sldId id="293" r:id="rId27"/>
-    <p:sldId id="294" r:id="rId28"/>
-    <p:sldId id="295" r:id="rId29"/>
-    <p:sldId id="296" r:id="rId30"/>
-    <p:sldId id="297" r:id="rId31"/>
-    <p:sldId id="298" r:id="rId32"/>
-    <p:sldId id="299" r:id="rId33"/>
-    <p:sldId id="300" r:id="rId34"/>
-    <p:sldId id="268" r:id="rId35"/>
-    <p:sldId id="279" r:id="rId36"/>
-    <p:sldId id="260" r:id="rId37"/>
-    <p:sldId id="264" r:id="rId38"/>
-    <p:sldId id="263" r:id="rId39"/>
-    <p:sldId id="301" r:id="rId40"/>
+    <p:sldId id="280" r:id="rId13"/>
+    <p:sldId id="281" r:id="rId14"/>
+    <p:sldId id="282" r:id="rId15"/>
+    <p:sldId id="283" r:id="rId16"/>
+    <p:sldId id="284" r:id="rId17"/>
+    <p:sldId id="285" r:id="rId18"/>
+    <p:sldId id="286" r:id="rId19"/>
+    <p:sldId id="287" r:id="rId20"/>
+    <p:sldId id="288" r:id="rId21"/>
+    <p:sldId id="289" r:id="rId22"/>
+    <p:sldId id="290" r:id="rId23"/>
+    <p:sldId id="291" r:id="rId24"/>
+    <p:sldId id="292" r:id="rId25"/>
+    <p:sldId id="293" r:id="rId26"/>
+    <p:sldId id="294" r:id="rId27"/>
+    <p:sldId id="295" r:id="rId28"/>
+    <p:sldId id="296" r:id="rId29"/>
+    <p:sldId id="297" r:id="rId30"/>
+    <p:sldId id="298" r:id="rId31"/>
+    <p:sldId id="299" r:id="rId32"/>
+    <p:sldId id="300" r:id="rId33"/>
+    <p:sldId id="268" r:id="rId34"/>
+    <p:sldId id="279" r:id="rId35"/>
+    <p:sldId id="260" r:id="rId36"/>
+    <p:sldId id="264" r:id="rId37"/>
+    <p:sldId id="263" r:id="rId38"/>
+    <p:sldId id="301" r:id="rId39"/>
   </p:sldIdLst>
   <p:sldSz cx="12192000" cy="6858000"/>
   <p:notesSz cx="6858000" cy="9144000"/>
@@ -863,6 +862,10 @@
               <a:buFont typeface="Arial" panose="020B0604020202020204" pitchFamily="34" charset="0"/>
               <a:buChar char="•"/>
             </a:pPr>
+            <a:r>
+              <a:rPr lang="en-US" dirty="0"/>
+              <a:t>REST is used exponentially more</a:t>
+            </a:r>
             <a:endParaRPr lang="tr-TR" dirty="0"/>
           </a:p>
         </p:txBody>
@@ -951,6 +954,46 @@
               <a:buFont typeface="Arial" panose="020B0604020202020204" pitchFamily="34" charset="0"/>
               <a:buChar char="•"/>
             </a:pPr>
+            <a:r>
+              <a:rPr lang="en-US" dirty="0"/>
+              <a:t>TTR = Testing framework</a:t>
+            </a:r>
+          </a:p>
+          <a:p>
+            <a:pPr marL="171450" marR="0" lvl="0" indent="-171450" algn="l" defTabSz="914400" rtl="0" eaLnBrk="1" fontAlgn="auto" latinLnBrk="0" hangingPunct="1">
+              <a:lnSpc>
+                <a:spcPct val="100000"/>
+              </a:lnSpc>
+              <a:spcBef>
+                <a:spcPts val="0"/>
+              </a:spcBef>
+              <a:spcAft>
+                <a:spcPts val="0"/>
+              </a:spcAft>
+              <a:buClrTx/>
+              <a:buSzTx/>
+              <a:buFont typeface="Arial" panose="020B0604020202020204" pitchFamily="34" charset="0"/>
+              <a:buChar char="•"/>
+              <a:tabLst/>
+              <a:defRPr/>
+            </a:pPr>
+            <a:r>
+              <a:rPr lang="fi-FI" dirty="0"/>
+              <a:t>Considering this paper is 2009, the very basic principle of testing is as shown in the graph</a:t>
+            </a:r>
+          </a:p>
+          <a:p>
+            <a:pPr marL="171450" indent="-171450">
+              <a:buFont typeface="Arial" panose="020B0604020202020204" pitchFamily="34" charset="0"/>
+              <a:buChar char="•"/>
+            </a:pPr>
+            <a:endParaRPr lang="en-US" dirty="0"/>
+          </a:p>
+          <a:p>
+            <a:pPr marL="171450" indent="-171450">
+              <a:buFont typeface="Arial" panose="020B0604020202020204" pitchFamily="34" charset="0"/>
+              <a:buChar char="•"/>
+            </a:pPr>
             <a:endParaRPr lang="tr-TR" dirty="0"/>
           </a:p>
         </p:txBody>
@@ -981,7 +1024,7 @@
     </p:spTree>
     <p:extLst>
       <p:ext uri="{BB962C8B-B14F-4D97-AF65-F5344CB8AC3E}">
-        <p14:creationId xmlns:p14="http://schemas.microsoft.com/office/powerpoint/2010/main" val="1595912988"/>
+        <p14:creationId xmlns:p14="http://schemas.microsoft.com/office/powerpoint/2010/main" val="3666314784"/>
       </p:ext>
     </p:extLst>
   </p:cSld>
@@ -1039,6 +1082,20 @@
               <a:buFont typeface="Arial" panose="020B0604020202020204" pitchFamily="34" charset="0"/>
               <a:buChar char="•"/>
             </a:pPr>
+            <a:r>
+              <a:rPr lang="fi-FI" dirty="0"/>
+              <a:t>Test case goes through the Sanity check in test case validator</a:t>
+            </a:r>
+          </a:p>
+          <a:p>
+            <a:pPr marL="171450" indent="-171450">
+              <a:buFont typeface="Arial" panose="020B0604020202020204" pitchFamily="34" charset="0"/>
+              <a:buChar char="•"/>
+            </a:pPr>
+            <a:r>
+              <a:rPr lang="fi-FI" dirty="0"/>
+              <a:t>HTTP responses are validated with external verifiers e.g. XML validator plugin</a:t>
+            </a:r>
             <a:endParaRPr lang="tr-TR" dirty="0"/>
           </a:p>
         </p:txBody>
@@ -1069,7 +1126,7 @@
     </p:spTree>
     <p:extLst>
       <p:ext uri="{BB962C8B-B14F-4D97-AF65-F5344CB8AC3E}">
-        <p14:creationId xmlns:p14="http://schemas.microsoft.com/office/powerpoint/2010/main" val="3666314784"/>
+        <p14:creationId xmlns:p14="http://schemas.microsoft.com/office/powerpoint/2010/main" val="1824932461"/>
       </p:ext>
     </p:extLst>
   </p:cSld>
@@ -1129,27 +1186,17 @@
             </a:pPr>
             <a:r>
               <a:rPr lang="fi-FI" dirty="0"/>
-              <a:t>Considering this paper is 2009, the very basic principle of testing is as shown in the graph</a:t>
-            </a:r>
-          </a:p>
-          <a:p>
-            <a:pPr marL="171450" indent="-171450">
+              <a:t>Test case specification language,</a:t>
+            </a:r>
+          </a:p>
+          <a:p>
+            <a:pPr marL="628650" lvl="1" indent="-171450">
               <a:buFont typeface="Arial" panose="020B0604020202020204" pitchFamily="34" charset="0"/>
               <a:buChar char="•"/>
             </a:pPr>
             <a:r>
               <a:rPr lang="fi-FI" dirty="0"/>
-              <a:t>Test case goes through the Sanity check in test case validator</a:t>
-            </a:r>
-          </a:p>
-          <a:p>
-            <a:pPr marL="171450" indent="-171450">
-              <a:buFont typeface="Arial" panose="020B0604020202020204" pitchFamily="34" charset="0"/>
-              <a:buChar char="•"/>
-            </a:pPr>
-            <a:r>
-              <a:rPr lang="fi-FI" dirty="0"/>
-              <a:t>HTTP responses are validated with external verifiers e.g. XML validator plugin</a:t>
+              <a:t>WADL: Web application development language. Markup language</a:t>
             </a:r>
             <a:endParaRPr lang="tr-TR" dirty="0"/>
           </a:p>
@@ -1181,7 +1228,7 @@
     </p:spTree>
     <p:extLst>
       <p:ext uri="{BB962C8B-B14F-4D97-AF65-F5344CB8AC3E}">
-        <p14:creationId xmlns:p14="http://schemas.microsoft.com/office/powerpoint/2010/main" val="1824932461"/>
+        <p14:creationId xmlns:p14="http://schemas.microsoft.com/office/powerpoint/2010/main" val="1072296589"/>
       </p:ext>
     </p:extLst>
   </p:cSld>
@@ -1239,20 +1286,6 @@
               <a:buFont typeface="Arial" panose="020B0604020202020204" pitchFamily="34" charset="0"/>
               <a:buChar char="•"/>
             </a:pPr>
-            <a:r>
-              <a:rPr lang="fi-FI" dirty="0"/>
-              <a:t>Inspired WebInject’s Test case specification language,</a:t>
-            </a:r>
-          </a:p>
-          <a:p>
-            <a:pPr marL="171450" indent="-171450">
-              <a:buFont typeface="Arial" panose="020B0604020202020204" pitchFamily="34" charset="0"/>
-              <a:buChar char="•"/>
-            </a:pPr>
-            <a:r>
-              <a:rPr lang="fi-FI" dirty="0"/>
-              <a:t>WADL: Web application development language. Markup language</a:t>
-            </a:r>
             <a:endParaRPr lang="tr-TR" dirty="0"/>
           </a:p>
         </p:txBody>
@@ -1283,7 +1316,7 @@
     </p:spTree>
     <p:extLst>
       <p:ext uri="{BB962C8B-B14F-4D97-AF65-F5344CB8AC3E}">
-        <p14:creationId xmlns:p14="http://schemas.microsoft.com/office/powerpoint/2010/main" val="1072296589"/>
+        <p14:creationId xmlns:p14="http://schemas.microsoft.com/office/powerpoint/2010/main" val="1039924075"/>
       </p:ext>
     </p:extLst>
   </p:cSld>
@@ -1341,6 +1374,20 @@
               <a:buFont typeface="Arial" panose="020B0604020202020204" pitchFamily="34" charset="0"/>
               <a:buChar char="•"/>
             </a:pPr>
+            <a:r>
+              <a:rPr lang="en-US" dirty="0"/>
+              <a:t>URI=resources should be reachable</a:t>
+            </a:r>
+          </a:p>
+          <a:p>
+            <a:pPr marL="171450" indent="-171450">
+              <a:buFont typeface="Arial" panose="020B0604020202020204" pitchFamily="34" charset="0"/>
+              <a:buChar char="•"/>
+            </a:pPr>
+            <a:r>
+              <a:rPr lang="en-US" dirty="0"/>
+              <a:t>Testing specific feature of web service = connectedness</a:t>
+            </a:r>
             <a:endParaRPr lang="tr-TR" dirty="0"/>
           </a:p>
         </p:txBody>
@@ -1371,7 +1418,7 @@
     </p:spTree>
     <p:extLst>
       <p:ext uri="{BB962C8B-B14F-4D97-AF65-F5344CB8AC3E}">
-        <p14:creationId xmlns:p14="http://schemas.microsoft.com/office/powerpoint/2010/main" val="1039924075"/>
+        <p14:creationId xmlns:p14="http://schemas.microsoft.com/office/powerpoint/2010/main" val="3742965005"/>
       </p:ext>
     </p:extLst>
   </p:cSld>
@@ -1429,10 +1476,6 @@
               <a:buFont typeface="Arial" panose="020B0604020202020204" pitchFamily="34" charset="0"/>
               <a:buChar char="•"/>
             </a:pPr>
-            <a:r>
-              <a:rPr lang="en-US" dirty="0"/>
-              <a:t>In the context of RESTful web-services, connectedness refers to the property wherein every resource in the web-service is reachable from the base resource by successive HTTP GET requests. Presence (or absence) of connectedness has practical implications and hence is an important property of RESTful web-services.</a:t>
-            </a:r>
             <a:endParaRPr lang="tr-TR" dirty="0"/>
           </a:p>
         </p:txBody>
@@ -1463,7 +1506,7 @@
     </p:spTree>
     <p:extLst>
       <p:ext uri="{BB962C8B-B14F-4D97-AF65-F5344CB8AC3E}">
-        <p14:creationId xmlns:p14="http://schemas.microsoft.com/office/powerpoint/2010/main" val="3742965005"/>
+        <p14:creationId xmlns:p14="http://schemas.microsoft.com/office/powerpoint/2010/main" val="2397404110"/>
       </p:ext>
     </p:extLst>
   </p:cSld>
@@ -1521,6 +1564,10 @@
               <a:buFont typeface="Arial" panose="020B0604020202020204" pitchFamily="34" charset="0"/>
               <a:buChar char="•"/>
             </a:pPr>
+            <a:r>
+              <a:rPr lang="en-US" dirty="0"/>
+              <a:t>Again not so good evaluation</a:t>
+            </a:r>
             <a:endParaRPr lang="tr-TR" dirty="0"/>
           </a:p>
         </p:txBody>
@@ -1551,7 +1598,7 @@
     </p:spTree>
     <p:extLst>
       <p:ext uri="{BB962C8B-B14F-4D97-AF65-F5344CB8AC3E}">
-        <p14:creationId xmlns:p14="http://schemas.microsoft.com/office/powerpoint/2010/main" val="2397404110"/>
+        <p14:creationId xmlns:p14="http://schemas.microsoft.com/office/powerpoint/2010/main" val="4266823833"/>
       </p:ext>
     </p:extLst>
   </p:cSld>
@@ -1609,7 +1656,10 @@
               <a:buFont typeface="Arial" panose="020B0604020202020204" pitchFamily="34" charset="0"/>
               <a:buChar char="•"/>
             </a:pPr>
-            <a:endParaRPr lang="tr-TR" dirty="0"/>
+            <a:r>
+              <a:rPr lang="en-US" dirty="0"/>
+              <a:t>Different testing method = Model-based testing</a:t>
+            </a:r>
           </a:p>
         </p:txBody>
       </p:sp>
@@ -1639,7 +1689,7 @@
     </p:spTree>
     <p:extLst>
       <p:ext uri="{BB962C8B-B14F-4D97-AF65-F5344CB8AC3E}">
-        <p14:creationId xmlns:p14="http://schemas.microsoft.com/office/powerpoint/2010/main" val="4266823833"/>
+        <p14:creationId xmlns:p14="http://schemas.microsoft.com/office/powerpoint/2010/main" val="392445518"/>
       </p:ext>
     </p:extLst>
   </p:cSld>
@@ -1697,6 +1747,36 @@
               <a:buFont typeface="Arial" panose="020B0604020202020204" pitchFamily="34" charset="0"/>
               <a:buChar char="•"/>
             </a:pPr>
+            <a:r>
+              <a:rPr lang="en-US" dirty="0"/>
+              <a:t>Protocol state machine defined as this, explain the meanings</a:t>
+            </a:r>
+          </a:p>
+          <a:p>
+            <a:pPr marL="171450" indent="-171450">
+              <a:buFont typeface="Arial" panose="020B0604020202020204" pitchFamily="34" charset="0"/>
+              <a:buChar char="•"/>
+            </a:pPr>
+            <a:r>
+              <a:rPr lang="en-US" dirty="0"/>
+              <a:t>Initial1,2 </a:t>
+            </a:r>
+            <a:r>
+              <a:rPr lang="en-US" dirty="0" err="1"/>
+              <a:t>etc</a:t>
+            </a:r>
+            <a:r>
+              <a:rPr lang="en-US" dirty="0"/>
+              <a:t> are </a:t>
+            </a:r>
+            <a:r>
+              <a:rPr lang="en-US" dirty="0" err="1"/>
+              <a:t>pseude</a:t>
+            </a:r>
+            <a:r>
+              <a:rPr lang="en-US" dirty="0"/>
+              <a:t> states</a:t>
+            </a:r>
             <a:endParaRPr lang="tr-TR" dirty="0"/>
           </a:p>
         </p:txBody>
@@ -1727,7 +1807,7 @@
     </p:spTree>
     <p:extLst>
       <p:ext uri="{BB962C8B-B14F-4D97-AF65-F5344CB8AC3E}">
-        <p14:creationId xmlns:p14="http://schemas.microsoft.com/office/powerpoint/2010/main" val="392445518"/>
+        <p14:creationId xmlns:p14="http://schemas.microsoft.com/office/powerpoint/2010/main" val="1154917599"/>
       </p:ext>
     </p:extLst>
   </p:cSld>
@@ -1932,10 +2012,31 @@
           <a:bodyPr/>
           <a:lstStyle/>
           <a:p>
-            <a:pPr marL="171450" indent="-171450">
-              <a:buFont typeface="Arial" panose="020B0604020202020204" pitchFamily="34" charset="0"/>
-              <a:buChar char="•"/>
-            </a:pPr>
+            <a:r>
+              <a:rPr lang="en-US" sz="1200" b="0" i="0" kern="1200" dirty="0">
+                <a:solidFill>
+                  <a:schemeClr val="tx1"/>
+                </a:solidFill>
+                <a:effectLst/>
+                <a:latin typeface="+mn-lt"/>
+                <a:ea typeface="+mn-ea"/>
+                <a:cs typeface="+mn-cs"/>
+              </a:rPr>
+              <a:t>XMI: XML Metadata Interchange</a:t>
+            </a:r>
+          </a:p>
+          <a:p>
+            <a:br>
+              <a:rPr lang="en-US" sz="1200" b="0" i="0" kern="1200" dirty="0">
+                <a:solidFill>
+                  <a:schemeClr val="tx1"/>
+                </a:solidFill>
+                <a:effectLst/>
+                <a:latin typeface="+mn-lt"/>
+                <a:ea typeface="+mn-ea"/>
+                <a:cs typeface="+mn-cs"/>
+              </a:rPr>
+            </a:br>
             <a:endParaRPr lang="tr-TR" dirty="0"/>
           </a:p>
         </p:txBody>
@@ -1966,7 +2067,7 @@
     </p:spTree>
     <p:extLst>
       <p:ext uri="{BB962C8B-B14F-4D97-AF65-F5344CB8AC3E}">
-        <p14:creationId xmlns:p14="http://schemas.microsoft.com/office/powerpoint/2010/main" val="1154917599"/>
+        <p14:creationId xmlns:p14="http://schemas.microsoft.com/office/powerpoint/2010/main" val="942135697"/>
       </p:ext>
     </p:extLst>
   </p:cSld>
@@ -2020,31 +2121,10 @@
           <a:bodyPr/>
           <a:lstStyle/>
           <a:p>
-            <a:r>
-              <a:rPr lang="en-US" sz="1200" b="0" i="0" kern="1200" dirty="0">
-                <a:solidFill>
-                  <a:schemeClr val="tx1"/>
-                </a:solidFill>
-                <a:effectLst/>
-                <a:latin typeface="+mn-lt"/>
-                <a:ea typeface="+mn-ea"/>
-                <a:cs typeface="+mn-cs"/>
-              </a:rPr>
-              <a:t>XMI: XML Metadata Interchange</a:t>
-            </a:r>
-          </a:p>
-          <a:p>
-            <a:br>
-              <a:rPr lang="en-US" sz="1200" b="0" i="0" kern="1200" dirty="0">
-                <a:solidFill>
-                  <a:schemeClr val="tx1"/>
-                </a:solidFill>
-                <a:effectLst/>
-                <a:latin typeface="+mn-lt"/>
-                <a:ea typeface="+mn-ea"/>
-                <a:cs typeface="+mn-cs"/>
-              </a:rPr>
-            </a:br>
+            <a:pPr marL="171450" indent="-171450">
+              <a:buFont typeface="Arial" panose="020B0604020202020204" pitchFamily="34" charset="0"/>
+              <a:buChar char="•"/>
+            </a:pPr>
             <a:endParaRPr lang="tr-TR" dirty="0"/>
           </a:p>
         </p:txBody>
@@ -2075,7 +2155,7 @@
     </p:spTree>
     <p:extLst>
       <p:ext uri="{BB962C8B-B14F-4D97-AF65-F5344CB8AC3E}">
-        <p14:creationId xmlns:p14="http://schemas.microsoft.com/office/powerpoint/2010/main" val="942135697"/>
+        <p14:creationId xmlns:p14="http://schemas.microsoft.com/office/powerpoint/2010/main" val="4205806407"/>
       </p:ext>
     </p:extLst>
   </p:cSld>
@@ -2157,6 +2237,44 @@
               </a:rPr>
               <a:t> (XML Schema Definition)</a:t>
             </a:r>
+          </a:p>
+          <a:p>
+            <a:pPr marL="171450" indent="-171450">
+              <a:buFont typeface="Arial" panose="020B0604020202020204" pitchFamily="34" charset="0"/>
+              <a:buChar char="•"/>
+            </a:pPr>
+            <a:r>
+              <a:rPr lang="en-US" sz="1200" b="0" i="0" u="none" strike="noStrike" kern="1200" baseline="0" dirty="0">
+                <a:solidFill>
+                  <a:schemeClr val="tx1"/>
+                </a:solidFill>
+                <a:latin typeface="+mn-lt"/>
+                <a:ea typeface="+mn-ea"/>
+                <a:cs typeface="+mn-cs"/>
+              </a:rPr>
+              <a:t>Input is a dataset made up of a test URL and HTTP method for the tested service, and a set of parameters to adjust the request. The larger this dataset, the better the quality of the anomaly detection and inferred XSD will be. </a:t>
+            </a:r>
+          </a:p>
+          <a:p>
+            <a:pPr marL="171450" indent="-171450">
+              <a:buFont typeface="Arial" panose="020B0604020202020204" pitchFamily="34" charset="0"/>
+              <a:buChar char="•"/>
+            </a:pPr>
+            <a:r>
+              <a:rPr lang="en-US" sz="1200" b="0" i="0" kern="1200" dirty="0">
+                <a:solidFill>
+                  <a:schemeClr val="tx1"/>
+                </a:solidFill>
+                <a:effectLst/>
+                <a:latin typeface="+mn-lt"/>
+                <a:ea typeface="+mn-ea"/>
+                <a:cs typeface="+mn-cs"/>
+              </a:rPr>
+              <a:t>XSD’s purpose is to validate the structure of another xml document. </a:t>
+            </a:r>
+            <a:br>
+              <a:rPr lang="en-US" dirty="0"/>
+            </a:br>
             <a:endParaRPr lang="tr-TR" dirty="0"/>
           </a:p>
         </p:txBody>
@@ -2187,7 +2305,7 @@
     </p:spTree>
     <p:extLst>
       <p:ext uri="{BB962C8B-B14F-4D97-AF65-F5344CB8AC3E}">
-        <p14:creationId xmlns:p14="http://schemas.microsoft.com/office/powerpoint/2010/main" val="4205806407"/>
+        <p14:creationId xmlns:p14="http://schemas.microsoft.com/office/powerpoint/2010/main" val="2967788478"/>
       </p:ext>
     </p:extLst>
   </p:cSld>
@@ -2269,44 +2387,6 @@
               </a:rPr>
               <a:t> (XML Schema Definition)</a:t>
             </a:r>
-          </a:p>
-          <a:p>
-            <a:pPr marL="171450" indent="-171450">
-              <a:buFont typeface="Arial" panose="020B0604020202020204" pitchFamily="34" charset="0"/>
-              <a:buChar char="•"/>
-            </a:pPr>
-            <a:r>
-              <a:rPr lang="en-US" sz="1200" b="0" i="0" u="none" strike="noStrike" kern="1200" baseline="0" dirty="0">
-                <a:solidFill>
-                  <a:schemeClr val="tx1"/>
-                </a:solidFill>
-                <a:latin typeface="+mn-lt"/>
-                <a:ea typeface="+mn-ea"/>
-                <a:cs typeface="+mn-cs"/>
-              </a:rPr>
-              <a:t>Input is a dataset made up of a test URL and HTTP method for the tested service, and a set of parameters to adjust the request. The larger this dataset, the better the quality of the anomaly detection and inferred XSD will be. </a:t>
-            </a:r>
-          </a:p>
-          <a:p>
-            <a:pPr marL="171450" indent="-171450">
-              <a:buFont typeface="Arial" panose="020B0604020202020204" pitchFamily="34" charset="0"/>
-              <a:buChar char="•"/>
-            </a:pPr>
-            <a:r>
-              <a:rPr lang="en-US" sz="1200" b="0" i="0" kern="1200" dirty="0">
-                <a:solidFill>
-                  <a:schemeClr val="tx1"/>
-                </a:solidFill>
-                <a:effectLst/>
-                <a:latin typeface="+mn-lt"/>
-                <a:ea typeface="+mn-ea"/>
-                <a:cs typeface="+mn-cs"/>
-              </a:rPr>
-              <a:t>XSD’s purpose is to validate the structure of another xml document. </a:t>
-            </a:r>
-            <a:br>
-              <a:rPr lang="en-US" dirty="0"/>
-            </a:br>
             <a:endParaRPr lang="tr-TR" dirty="0"/>
           </a:p>
         </p:txBody>
@@ -2337,7 +2417,7 @@
     </p:spTree>
     <p:extLst>
       <p:ext uri="{BB962C8B-B14F-4D97-AF65-F5344CB8AC3E}">
-        <p14:creationId xmlns:p14="http://schemas.microsoft.com/office/powerpoint/2010/main" val="2967788478"/>
+        <p14:creationId xmlns:p14="http://schemas.microsoft.com/office/powerpoint/2010/main" val="1802497447"/>
       </p:ext>
     </p:extLst>
   </p:cSld>
@@ -2395,30 +2475,6 @@
               <a:buFont typeface="Arial" panose="020B0604020202020204" pitchFamily="34" charset="0"/>
               <a:buChar char="•"/>
             </a:pPr>
-            <a:r>
-              <a:rPr lang="en-US" sz="1200" b="1" i="0" kern="1200" dirty="0">
-                <a:solidFill>
-                  <a:schemeClr val="tx1"/>
-                </a:solidFill>
-                <a:effectLst/>
-                <a:latin typeface="+mn-lt"/>
-                <a:ea typeface="+mn-ea"/>
-                <a:cs typeface="+mn-cs"/>
-              </a:rPr>
-              <a:t>XSD</a:t>
-            </a:r>
-            <a:r>
-              <a:rPr lang="en-US" sz="1200" b="0" i="0" kern="1200" dirty="0">
-                <a:solidFill>
-                  <a:schemeClr val="tx1"/>
-                </a:solidFill>
-                <a:effectLst/>
-                <a:latin typeface="+mn-lt"/>
-                <a:ea typeface="+mn-ea"/>
-                <a:cs typeface="+mn-cs"/>
-              </a:rPr>
-              <a:t> (XML Schema Definition)</a:t>
-            </a:r>
             <a:endParaRPr lang="tr-TR" dirty="0"/>
           </a:p>
         </p:txBody>
@@ -2449,7 +2505,7 @@
     </p:spTree>
     <p:extLst>
       <p:ext uri="{BB962C8B-B14F-4D97-AF65-F5344CB8AC3E}">
-        <p14:creationId xmlns:p14="http://schemas.microsoft.com/office/powerpoint/2010/main" val="1802497447"/>
+        <p14:creationId xmlns:p14="http://schemas.microsoft.com/office/powerpoint/2010/main" val="984761793"/>
       </p:ext>
     </p:extLst>
   </p:cSld>
@@ -2503,10 +2559,6 @@
           <a:bodyPr/>
           <a:lstStyle/>
           <a:p>
-            <a:pPr marL="171450" indent="-171450">
-              <a:buFont typeface="Arial" panose="020B0604020202020204" pitchFamily="34" charset="0"/>
-              <a:buChar char="•"/>
-            </a:pPr>
             <a:endParaRPr lang="tr-TR" dirty="0"/>
           </a:p>
         </p:txBody>
@@ -2537,7 +2589,7 @@
     </p:spTree>
     <p:extLst>
       <p:ext uri="{BB962C8B-B14F-4D97-AF65-F5344CB8AC3E}">
-        <p14:creationId xmlns:p14="http://schemas.microsoft.com/office/powerpoint/2010/main" val="984761793"/>
+        <p14:creationId xmlns:p14="http://schemas.microsoft.com/office/powerpoint/2010/main" val="2786548330"/>
       </p:ext>
     </p:extLst>
   </p:cSld>
@@ -2591,7 +2643,121 @@
           <a:bodyPr/>
           <a:lstStyle/>
           <a:p>
+            <a:r>
+              <a:rPr lang="en-US" sz="1200" b="0" i="0" u="none" strike="noStrike" kern="1200" baseline="0" dirty="0">
+                <a:solidFill>
+                  <a:schemeClr val="tx1"/>
+                </a:solidFill>
+                <a:latin typeface="+mn-lt"/>
+                <a:ea typeface="+mn-ea"/>
+                <a:cs typeface="+mn-cs"/>
+              </a:rPr>
+              <a:t>evolve test suites, we use the </a:t>
+            </a:r>
+            <a:r>
+              <a:rPr lang="en-US" sz="1200" b="0" i="1" u="none" strike="noStrike" kern="1200" baseline="0" dirty="0">
+                <a:solidFill>
+                  <a:schemeClr val="tx1"/>
+                </a:solidFill>
+                <a:latin typeface="+mn-lt"/>
+                <a:ea typeface="+mn-ea"/>
+                <a:cs typeface="+mn-cs"/>
+              </a:rPr>
+              <a:t>Whole Test Suite. </a:t>
+            </a:r>
+            <a:r>
+              <a:rPr lang="en-US" sz="1200" b="0" i="0" u="none" strike="noStrike" kern="1200" baseline="0" dirty="0">
+                <a:solidFill>
+                  <a:schemeClr val="tx1"/>
+                </a:solidFill>
+                <a:latin typeface="+mn-lt"/>
+                <a:ea typeface="+mn-ea"/>
+                <a:cs typeface="+mn-cs"/>
+              </a:rPr>
+              <a:t>A</a:t>
+            </a:r>
+          </a:p>
+          <a:p>
+            <a:r>
+              <a:rPr lang="en-US" sz="1200" b="0" i="0" u="none" strike="noStrike" kern="1200" baseline="0" dirty="0">
+                <a:solidFill>
+                  <a:schemeClr val="tx1"/>
+                </a:solidFill>
+                <a:latin typeface="+mn-lt"/>
+                <a:ea typeface="+mn-ea"/>
+                <a:cs typeface="+mn-cs"/>
+              </a:rPr>
+              <a:t>GA individual will be a set of test cases, randomly initialized. The fitness of a test suite is</a:t>
+            </a:r>
+          </a:p>
+          <a:p>
+            <a:r>
+              <a:rPr lang="en-US" sz="1200" b="0" i="0" u="none" strike="noStrike" kern="1200" baseline="0" dirty="0">
+                <a:solidFill>
+                  <a:schemeClr val="tx1"/>
+                </a:solidFill>
+                <a:latin typeface="+mn-lt"/>
+                <a:ea typeface="+mn-ea"/>
+                <a:cs typeface="+mn-cs"/>
+              </a:rPr>
+              <a:t>the aggregated fitness of all of its test cases. The crossover</a:t>
+            </a:r>
+          </a:p>
+          <a:p>
+            <a:r>
+              <a:rPr lang="en-US" sz="1200" b="0" i="0" u="none" strike="noStrike" kern="1200" baseline="0" dirty="0">
+                <a:solidFill>
+                  <a:schemeClr val="tx1"/>
+                </a:solidFill>
+                <a:latin typeface="+mn-lt"/>
+                <a:ea typeface="+mn-ea"/>
+                <a:cs typeface="+mn-cs"/>
+              </a:rPr>
+              <a:t>operator will mix test cases from two parent sets when new</a:t>
+            </a:r>
+          </a:p>
+          <a:p>
+            <a:r>
+              <a:rPr lang="en-US" sz="1200" b="0" i="0" u="none" strike="noStrike" kern="1200" baseline="0" dirty="0">
+                <a:solidFill>
+                  <a:schemeClr val="tx1"/>
+                </a:solidFill>
+                <a:latin typeface="+mn-lt"/>
+                <a:ea typeface="+mn-ea"/>
+                <a:cs typeface="+mn-cs"/>
+              </a:rPr>
+              <a:t>offspring are generated. The mutation operator will do small</a:t>
+            </a:r>
+          </a:p>
+          <a:p>
+            <a:r>
+              <a:rPr lang="en-US" sz="1200" b="0" i="0" u="none" strike="noStrike" kern="1200" baseline="0" dirty="0">
+                <a:solidFill>
+                  <a:schemeClr val="tx1"/>
+                </a:solidFill>
+                <a:latin typeface="+mn-lt"/>
+                <a:ea typeface="+mn-ea"/>
+                <a:cs typeface="+mn-cs"/>
+              </a:rPr>
+              <a:t>modifications on each test case, like increasing or decreasing</a:t>
+            </a:r>
+          </a:p>
+          <a:p>
+            <a:r>
+              <a:rPr lang="en-US" sz="1200" b="0" i="0" u="none" strike="noStrike" kern="1200" baseline="0" dirty="0">
+                <a:solidFill>
+                  <a:schemeClr val="tx1"/>
+                </a:solidFill>
+                <a:latin typeface="+mn-lt"/>
+                <a:ea typeface="+mn-ea"/>
+                <a:cs typeface="+mn-cs"/>
+              </a:rPr>
+              <a:t>a numeric variable by 1.</a:t>
+            </a:r>
             <a:endParaRPr lang="tr-TR" dirty="0"/>
+          </a:p>
+          <a:p>
+            <a:endParaRPr lang="en-US" dirty="0"/>
           </a:p>
         </p:txBody>
       </p:sp>
@@ -2610,7 +2776,7 @@
           <a:bodyPr/>
           <a:lstStyle/>
           <a:p>
-            <a:fld id="{CF2FD335-6D8E-486A-8F5F-DFC7325903FF}" type="slidenum">
+            <a:fld id="{32674CE4-FBD8-4481-AEFB-CA53E599A745}" type="slidenum">
               <a:rPr lang="en-US" smtClean="0"/>
               <a:t>26</a:t>
             </a:fld>
@@ -2621,7 +2787,7 @@
     </p:spTree>
     <p:extLst>
       <p:ext uri="{BB962C8B-B14F-4D97-AF65-F5344CB8AC3E}">
-        <p14:creationId xmlns:p14="http://schemas.microsoft.com/office/powerpoint/2010/main" val="2786548330"/>
+        <p14:creationId xmlns:p14="http://schemas.microsoft.com/office/powerpoint/2010/main" val="1936271270"/>
       </p:ext>
     </p:extLst>
   </p:cSld>
@@ -2819,7 +2985,7 @@
     </p:spTree>
     <p:extLst>
       <p:ext uri="{BB962C8B-B14F-4D97-AF65-F5344CB8AC3E}">
-        <p14:creationId xmlns:p14="http://schemas.microsoft.com/office/powerpoint/2010/main" val="1936271270"/>
+        <p14:creationId xmlns:p14="http://schemas.microsoft.com/office/powerpoint/2010/main" val="415033736"/>
       </p:ext>
     </p:extLst>
   </p:cSld>
@@ -3017,7 +3183,7 @@
     </p:spTree>
     <p:extLst>
       <p:ext uri="{BB962C8B-B14F-4D97-AF65-F5344CB8AC3E}">
-        <p14:creationId xmlns:p14="http://schemas.microsoft.com/office/powerpoint/2010/main" val="415033736"/>
+        <p14:creationId xmlns:p14="http://schemas.microsoft.com/office/powerpoint/2010/main" val="2470900146"/>
       </p:ext>
     </p:extLst>
   </p:cSld>
@@ -3080,19 +3246,10 @@
                 <a:ea typeface="+mn-ea"/>
                 <a:cs typeface="+mn-cs"/>
               </a:rPr>
-              <a:t>evolve test suites, we use the </a:t>
-            </a:r>
-            <a:r>
-              <a:rPr lang="en-US" sz="1200" b="0" i="1" u="none" strike="noStrike" kern="1200" baseline="0" dirty="0">
-                <a:solidFill>
-                  <a:schemeClr val="tx1"/>
-                </a:solidFill>
-                <a:latin typeface="+mn-lt"/>
-                <a:ea typeface="+mn-ea"/>
-                <a:cs typeface="+mn-cs"/>
-              </a:rPr>
-              <a:t>Whole Test Suite. </a:t>
-            </a:r>
+              <a:t>ENDPOINTS: THE NUMBER OF EXPOSED RESOURCES AND HTTP METHODS</a:t>
+            </a:r>
+          </a:p>
+          <a:p>
             <a:r>
               <a:rPr lang="en-US" sz="1200" b="0" i="0" u="none" strike="noStrike" kern="1200" baseline="0" dirty="0">
                 <a:solidFill>
@@ -3102,90 +3259,9 @@
                 <a:ea typeface="+mn-ea"/>
                 <a:cs typeface="+mn-cs"/>
               </a:rPr>
-              <a:t>A</a:t>
-            </a:r>
-          </a:p>
-          <a:p>
-            <a:r>
-              <a:rPr lang="en-US" sz="1200" b="0" i="0" u="none" strike="noStrike" kern="1200" baseline="0" dirty="0">
-                <a:solidFill>
-                  <a:schemeClr val="tx1"/>
-                </a:solidFill>
-                <a:latin typeface="+mn-lt"/>
-                <a:ea typeface="+mn-ea"/>
-                <a:cs typeface="+mn-cs"/>
-              </a:rPr>
-              <a:t>GA individual will be a set of test cases, randomly initialized. The fitness of a test suite is</a:t>
-            </a:r>
-          </a:p>
-          <a:p>
-            <a:r>
-              <a:rPr lang="en-US" sz="1200" b="0" i="0" u="none" strike="noStrike" kern="1200" baseline="0" dirty="0">
-                <a:solidFill>
-                  <a:schemeClr val="tx1"/>
-                </a:solidFill>
-                <a:latin typeface="+mn-lt"/>
-                <a:ea typeface="+mn-ea"/>
-                <a:cs typeface="+mn-cs"/>
-              </a:rPr>
-              <a:t>the aggregated fitness of all of its test cases. The crossover</a:t>
-            </a:r>
-          </a:p>
-          <a:p>
-            <a:r>
-              <a:rPr lang="en-US" sz="1200" b="0" i="0" u="none" strike="noStrike" kern="1200" baseline="0" dirty="0">
-                <a:solidFill>
-                  <a:schemeClr val="tx1"/>
-                </a:solidFill>
-                <a:latin typeface="+mn-lt"/>
-                <a:ea typeface="+mn-ea"/>
-                <a:cs typeface="+mn-cs"/>
-              </a:rPr>
-              <a:t>operator will mix test cases from two parent sets when new</a:t>
-            </a:r>
-          </a:p>
-          <a:p>
-            <a:r>
-              <a:rPr lang="en-US" sz="1200" b="0" i="0" u="none" strike="noStrike" kern="1200" baseline="0" dirty="0">
-                <a:solidFill>
-                  <a:schemeClr val="tx1"/>
-                </a:solidFill>
-                <a:latin typeface="+mn-lt"/>
-                <a:ea typeface="+mn-ea"/>
-                <a:cs typeface="+mn-cs"/>
-              </a:rPr>
-              <a:t>offspring are generated. The mutation operator will do small</a:t>
-            </a:r>
-          </a:p>
-          <a:p>
-            <a:r>
-              <a:rPr lang="en-US" sz="1200" b="0" i="0" u="none" strike="noStrike" kern="1200" baseline="0" dirty="0">
-                <a:solidFill>
-                  <a:schemeClr val="tx1"/>
-                </a:solidFill>
-                <a:latin typeface="+mn-lt"/>
-                <a:ea typeface="+mn-ea"/>
-                <a:cs typeface="+mn-cs"/>
-              </a:rPr>
-              <a:t>modifications on each test case, like increasing or decreasing</a:t>
-            </a:r>
-          </a:p>
-          <a:p>
-            <a:r>
-              <a:rPr lang="en-US" sz="1200" b="0" i="0" u="none" strike="noStrike" kern="1200" baseline="0" dirty="0">
-                <a:solidFill>
-                  <a:schemeClr val="tx1"/>
-                </a:solidFill>
-                <a:latin typeface="+mn-lt"/>
-                <a:ea typeface="+mn-ea"/>
-                <a:cs typeface="+mn-cs"/>
-              </a:rPr>
-              <a:t>a numeric variable by 1.</a:t>
+              <a:t>APPLICABLE ON THEM</a:t>
             </a:r>
             <a:endParaRPr lang="tr-TR" dirty="0"/>
-          </a:p>
-          <a:p>
-            <a:endParaRPr lang="en-US" dirty="0"/>
           </a:p>
         </p:txBody>
       </p:sp>
@@ -3204,7 +3280,7 @@
           <a:bodyPr/>
           <a:lstStyle/>
           <a:p>
-            <a:fld id="{32674CE4-FBD8-4481-AEFB-CA53E599A745}" type="slidenum">
+            <a:fld id="{CF2FD335-6D8E-486A-8F5F-DFC7325903FF}" type="slidenum">
               <a:rPr lang="en-US" smtClean="0"/>
               <a:t>29</a:t>
             </a:fld>
@@ -3215,7 +3291,7 @@
     </p:spTree>
     <p:extLst>
       <p:ext uri="{BB962C8B-B14F-4D97-AF65-F5344CB8AC3E}">
-        <p14:creationId xmlns:p14="http://schemas.microsoft.com/office/powerpoint/2010/main" val="2470900146"/>
+        <p14:creationId xmlns:p14="http://schemas.microsoft.com/office/powerpoint/2010/main" val="3397667016"/>
       </p:ext>
     </p:extLst>
   </p:cSld>
@@ -3273,6 +3349,20 @@
               <a:buFont typeface="Arial" panose="020B0604020202020204" pitchFamily="34" charset="0"/>
               <a:buChar char="•"/>
             </a:pPr>
+            <a:r>
+              <a:rPr lang="en-US" dirty="0"/>
+              <a:t>Testing is the part of the quality assurance of the software development</a:t>
+            </a:r>
+          </a:p>
+          <a:p>
+            <a:pPr marL="171450" indent="-171450">
+              <a:buFont typeface="Arial" panose="020B0604020202020204" pitchFamily="34" charset="0"/>
+              <a:buChar char="•"/>
+            </a:pPr>
+            <a:r>
+              <a:rPr lang="en-US" dirty="0"/>
+              <a:t>But it is time consuming</a:t>
+            </a:r>
             <a:endParaRPr lang="tr-TR" dirty="0"/>
           </a:p>
         </p:txBody>
@@ -3411,7 +3501,7 @@
     </p:spTree>
     <p:extLst>
       <p:ext uri="{BB962C8B-B14F-4D97-AF65-F5344CB8AC3E}">
-        <p14:creationId xmlns:p14="http://schemas.microsoft.com/office/powerpoint/2010/main" val="3397667016"/>
+        <p14:creationId xmlns:p14="http://schemas.microsoft.com/office/powerpoint/2010/main" val="2410118463"/>
       </p:ext>
     </p:extLst>
   </p:cSld>
@@ -3465,29 +3555,33 @@
           <a:bodyPr/>
           <a:lstStyle/>
           <a:p>
-            <a:r>
-              <a:rPr lang="en-US" sz="1200" b="0" i="0" u="none" strike="noStrike" kern="1200" baseline="0" dirty="0">
-                <a:solidFill>
-                  <a:schemeClr val="tx1"/>
-                </a:solidFill>
-                <a:latin typeface="+mn-lt"/>
-                <a:ea typeface="+mn-ea"/>
-                <a:cs typeface="+mn-cs"/>
-              </a:rPr>
-              <a:t>ENDPOINTS: THE NUMBER OF EXPOSED RESOURCES AND HTTP METHODS</a:t>
-            </a:r>
-          </a:p>
-          <a:p>
-            <a:r>
-              <a:rPr lang="en-US" sz="1200" b="0" i="0" u="none" strike="noStrike" kern="1200" baseline="0" dirty="0">
-                <a:solidFill>
-                  <a:schemeClr val="tx1"/>
-                </a:solidFill>
-                <a:latin typeface="+mn-lt"/>
-                <a:ea typeface="+mn-ea"/>
-                <a:cs typeface="+mn-cs"/>
-              </a:rPr>
-              <a:t>APPLICABLE ON THEM</a:t>
+            <a:pPr marL="171450" indent="-171450">
+              <a:buFont typeface="Arial" panose="020B0604020202020204" pitchFamily="34" charset="0"/>
+              <a:buChar char="•"/>
+            </a:pPr>
+            <a:r>
+              <a:rPr lang="en-US" dirty="0"/>
+              <a:t>Automated coverage result is less than manual</a:t>
+            </a:r>
+          </a:p>
+          <a:p>
+            <a:pPr marL="171450" indent="-171450">
+              <a:buFont typeface="Arial" panose="020B0604020202020204" pitchFamily="34" charset="0"/>
+              <a:buChar char="•"/>
+            </a:pPr>
+            <a:r>
+              <a:rPr lang="en-US" dirty="0"/>
+              <a:t>Mutation takes place only in one direction</a:t>
+            </a:r>
+          </a:p>
+          <a:p>
+            <a:pPr marL="171450" indent="-171450">
+              <a:buFont typeface="Arial" panose="020B0604020202020204" pitchFamily="34" charset="0"/>
+              <a:buChar char="•"/>
+            </a:pPr>
+            <a:r>
+              <a:rPr lang="en-US" dirty="0"/>
+              <a:t>Not feasible for continuous testing</a:t>
             </a:r>
             <a:endParaRPr lang="tr-TR" dirty="0"/>
           </a:p>
@@ -3519,7 +3613,7 @@
     </p:spTree>
     <p:extLst>
       <p:ext uri="{BB962C8B-B14F-4D97-AF65-F5344CB8AC3E}">
-        <p14:creationId xmlns:p14="http://schemas.microsoft.com/office/powerpoint/2010/main" val="2410118463"/>
+        <p14:creationId xmlns:p14="http://schemas.microsoft.com/office/powerpoint/2010/main" val="2861290866"/>
       </p:ext>
     </p:extLst>
   </p:cSld>
@@ -3579,29 +3673,8 @@
             </a:pPr>
             <a:r>
               <a:rPr lang="en-US" dirty="0"/>
-              <a:t>Automated coverage result is less than manual</a:t>
-            </a:r>
-          </a:p>
-          <a:p>
-            <a:pPr marL="171450" indent="-171450">
-              <a:buFont typeface="Arial" panose="020B0604020202020204" pitchFamily="34" charset="0"/>
-              <a:buChar char="•"/>
-            </a:pPr>
-            <a:r>
-              <a:rPr lang="en-US" dirty="0"/>
-              <a:t>Mutation takes place only in one direction</a:t>
-            </a:r>
-          </a:p>
-          <a:p>
-            <a:pPr marL="171450" indent="-171450">
-              <a:buFont typeface="Arial" panose="020B0604020202020204" pitchFamily="34" charset="0"/>
-              <a:buChar char="•"/>
-            </a:pPr>
-            <a:r>
-              <a:rPr lang="en-US" dirty="0"/>
-              <a:t>Not feasible for continuous testing</a:t>
-            </a:r>
-            <a:endParaRPr lang="tr-TR" dirty="0"/>
+              <a:t>Total of 177 papers</a:t>
+            </a:r>
           </a:p>
         </p:txBody>
       </p:sp>
@@ -3622,7 +3695,7 @@
           <a:p>
             <a:fld id="{CF2FD335-6D8E-486A-8F5F-DFC7325903FF}" type="slidenum">
               <a:rPr lang="en-US" smtClean="0"/>
-              <a:t>32</a:t>
+              <a:t>33</a:t>
             </a:fld>
             <a:endParaRPr lang="en-US" dirty="0"/>
           </a:p>
@@ -3631,7 +3704,7 @@
     </p:spTree>
     <p:extLst>
       <p:ext uri="{BB962C8B-B14F-4D97-AF65-F5344CB8AC3E}">
-        <p14:creationId xmlns:p14="http://schemas.microsoft.com/office/powerpoint/2010/main" val="2861290866"/>
+        <p14:creationId xmlns:p14="http://schemas.microsoft.com/office/powerpoint/2010/main" val="2889348191"/>
       </p:ext>
     </p:extLst>
   </p:cSld>
@@ -3691,7 +3764,17 @@
             </a:pPr>
             <a:r>
               <a:rPr lang="en-US" dirty="0"/>
-              <a:t>Total of 177 papers</a:t>
+              <a:t>How presentation will benefit audience: Adult learners are more interested in a subject if they know how or why it is important to them.</a:t>
+            </a:r>
+          </a:p>
+          <a:p>
+            <a:pPr marL="171450" indent="-171450">
+              <a:buFont typeface="Arial" panose="020B0604020202020204" pitchFamily="34" charset="0"/>
+              <a:buChar char="•"/>
+            </a:pPr>
+            <a:r>
+              <a:rPr lang="en-US" dirty="0"/>
+              <a:t>Presenter’s level of expertise in the subject: Briefly state your credentials in this area, or explain why participants should listen to you.</a:t>
             </a:r>
           </a:p>
         </p:txBody>
@@ -3722,7 +3805,7 @@
     </p:spTree>
     <p:extLst>
       <p:ext uri="{BB962C8B-B14F-4D97-AF65-F5344CB8AC3E}">
-        <p14:creationId xmlns:p14="http://schemas.microsoft.com/office/powerpoint/2010/main" val="2889348191"/>
+        <p14:creationId xmlns:p14="http://schemas.microsoft.com/office/powerpoint/2010/main" val="3176715259"/>
       </p:ext>
     </p:extLst>
   </p:cSld>
@@ -3823,7 +3906,7 @@
     </p:spTree>
     <p:extLst>
       <p:ext uri="{BB962C8B-B14F-4D97-AF65-F5344CB8AC3E}">
-        <p14:creationId xmlns:p14="http://schemas.microsoft.com/office/powerpoint/2010/main" val="3176715259"/>
+        <p14:creationId xmlns:p14="http://schemas.microsoft.com/office/powerpoint/2010/main" val="2917525422"/>
       </p:ext>
     </p:extLst>
   </p:cSld>
@@ -3924,7 +4007,7 @@
     </p:spTree>
     <p:extLst>
       <p:ext uri="{BB962C8B-B14F-4D97-AF65-F5344CB8AC3E}">
-        <p14:creationId xmlns:p14="http://schemas.microsoft.com/office/powerpoint/2010/main" val="2917525422"/>
+        <p14:creationId xmlns:p14="http://schemas.microsoft.com/office/powerpoint/2010/main" val="1428825480"/>
       </p:ext>
     </p:extLst>
   </p:cSld>
@@ -4017,107 +4100,6 @@
             <a:fld id="{CF2FD335-6D8E-486A-8F5F-DFC7325903FF}" type="slidenum">
               <a:rPr lang="en-US" smtClean="0"/>
               <a:t>37</a:t>
-            </a:fld>
-            <a:endParaRPr lang="en-US" dirty="0"/>
-          </a:p>
-        </p:txBody>
-      </p:sp>
-    </p:spTree>
-    <p:extLst>
-      <p:ext uri="{BB962C8B-B14F-4D97-AF65-F5344CB8AC3E}">
-        <p14:creationId xmlns:p14="http://schemas.microsoft.com/office/powerpoint/2010/main" val="1428825480"/>
-      </p:ext>
-    </p:extLst>
-  </p:cSld>
-  <p:clrMapOvr>
-    <a:masterClrMapping/>
-  </p:clrMapOvr>
-</p:notes>
-</file>
-
-<file path=ppt/notesSlides/notesSlide37.xml><?xml version="1.0" encoding="utf-8"?>
-<p:notes xmlns:a="http://schemas.openxmlformats.org/drawingml/2006/main" xmlns:r="http://schemas.openxmlformats.org/officeDocument/2006/relationships" xmlns:p="http://schemas.openxmlformats.org/presentationml/2006/main">
-  <p:cSld>
-    <p:spTree>
-      <p:nvGrpSpPr>
-        <p:cNvPr id="1" name=""/>
-        <p:cNvGrpSpPr/>
-        <p:nvPr/>
-      </p:nvGrpSpPr>
-      <p:grpSpPr>
-        <a:xfrm>
-          <a:off x="0" y="0"/>
-          <a:ext cx="0" cy="0"/>
-          <a:chOff x="0" y="0"/>
-          <a:chExt cx="0" cy="0"/>
-        </a:xfrm>
-      </p:grpSpPr>
-      <p:sp>
-        <p:nvSpPr>
-          <p:cNvPr id="2" name="Slide Image Placeholder 1"/>
-          <p:cNvSpPr>
-            <a:spLocks noGrp="1" noRot="1" noChangeAspect="1"/>
-          </p:cNvSpPr>
-          <p:nvPr>
-            <p:ph type="sldImg"/>
-          </p:nvPr>
-        </p:nvSpPr>
-        <p:spPr/>
-      </p:sp>
-      <p:sp>
-        <p:nvSpPr>
-          <p:cNvPr id="3" name="Notes Placeholder 2"/>
-          <p:cNvSpPr>
-            <a:spLocks noGrp="1"/>
-          </p:cNvSpPr>
-          <p:nvPr>
-            <p:ph type="body" idx="1"/>
-          </p:nvPr>
-        </p:nvSpPr>
-        <p:spPr/>
-        <p:txBody>
-          <a:bodyPr/>
-          <a:lstStyle/>
-          <a:p>
-            <a:pPr marL="171450" indent="-171450">
-              <a:buFont typeface="Arial" panose="020B0604020202020204" pitchFamily="34" charset="0"/>
-              <a:buChar char="•"/>
-            </a:pPr>
-            <a:r>
-              <a:rPr lang="en-US" dirty="0"/>
-              <a:t>How presentation will benefit audience: Adult learners are more interested in a subject if they know how or why it is important to them.</a:t>
-            </a:r>
-          </a:p>
-          <a:p>
-            <a:pPr marL="171450" indent="-171450">
-              <a:buFont typeface="Arial" panose="020B0604020202020204" pitchFamily="34" charset="0"/>
-              <a:buChar char="•"/>
-            </a:pPr>
-            <a:r>
-              <a:rPr lang="en-US" dirty="0"/>
-              <a:t>Presenter’s level of expertise in the subject: Briefly state your credentials in this area, or explain why participants should listen to you.</a:t>
-            </a:r>
-          </a:p>
-        </p:txBody>
-      </p:sp>
-      <p:sp>
-        <p:nvSpPr>
-          <p:cNvPr id="4" name="Slide Number Placeholder 3"/>
-          <p:cNvSpPr>
-            <a:spLocks noGrp="1"/>
-          </p:cNvSpPr>
-          <p:nvPr>
-            <p:ph type="sldNum" sz="quarter" idx="10"/>
-          </p:nvPr>
-        </p:nvSpPr>
-        <p:spPr/>
-        <p:txBody>
-          <a:bodyPr/>
-          <a:lstStyle/>
-          <a:p>
-            <a:fld id="{CF2FD335-6D8E-486A-8F5F-DFC7325903FF}" type="slidenum">
-              <a:rPr lang="en-US" smtClean="0"/>
-              <a:t>38</a:t>
             </a:fld>
             <a:endParaRPr lang="en-US" dirty="0"/>
           </a:p>
@@ -4184,7 +4166,35 @@
               <a:buFont typeface="Arial" panose="020B0604020202020204" pitchFamily="34" charset="0"/>
               <a:buChar char="•"/>
             </a:pPr>
-            <a:endParaRPr lang="tr-TR" dirty="0"/>
+            <a:r>
+              <a:rPr lang="en-US" dirty="0"/>
+              <a:t>They categorize testing levels</a:t>
+            </a:r>
+          </a:p>
+          <a:p>
+            <a:pPr marL="171450" indent="-171450">
+              <a:buFont typeface="Arial" panose="020B0604020202020204" pitchFamily="34" charset="0"/>
+              <a:buChar char="•"/>
+            </a:pPr>
+            <a:r>
+              <a:rPr lang="en-US" dirty="0"/>
+              <a:t>Also testing perspective (integrator, developer </a:t>
+            </a:r>
+            <a:r>
+              <a:rPr lang="en-US" dirty="0" err="1"/>
+              <a:t>etc</a:t>
+            </a:r>
+            <a:r>
+              <a:rPr lang="en-US" dirty="0"/>
+              <a:t>) but no need to go deeper</a:t>
+            </a:r>
+          </a:p>
+          <a:p>
+            <a:pPr marL="171450" indent="-171450">
+              <a:buFont typeface="Arial" panose="020B0604020202020204" pitchFamily="34" charset="0"/>
+              <a:buChar char="•"/>
+            </a:pPr>
+            <a:endParaRPr lang="en-US" dirty="0"/>
           </a:p>
         </p:txBody>
       </p:sp>
@@ -4272,7 +4282,10 @@
               <a:buFont typeface="Arial" panose="020B0604020202020204" pitchFamily="34" charset="0"/>
               <a:buChar char="•"/>
             </a:pPr>
-            <a:endParaRPr lang="tr-TR" dirty="0"/>
+            <a:r>
+              <a:rPr lang="en-US" dirty="0"/>
+              <a:t>You will see this term in somewhere, so this is the explanation</a:t>
+            </a:r>
           </a:p>
         </p:txBody>
       </p:sp>
@@ -4626,14 +4639,8 @@
             </a:pPr>
             <a:r>
               <a:rPr lang="en-US" dirty="0"/>
-              <a:t>Stateless:</a:t>
-            </a:r>
-          </a:p>
-          <a:p>
-            <a:pPr marL="628650" lvl="1" indent="-171450">
-              <a:buFont typeface="Arial" panose="020B0604020202020204" pitchFamily="34" charset="0"/>
-              <a:buChar char="•"/>
-            </a:pPr>
+              <a:t>Stateless: </a:t>
+            </a:r>
             <a:r>
               <a:rPr lang="en-US" sz="1200" b="0" i="0" kern="1200" dirty="0">
                 <a:solidFill>
@@ -4644,7 +4651,43 @@
                 <a:ea typeface="+mn-ea"/>
                 <a:cs typeface="+mn-cs"/>
               </a:rPr>
-              <a:t>By </a:t>
+              <a:t>server does not store any state about the client session on the server side</a:t>
+            </a:r>
+          </a:p>
+          <a:p>
+            <a:pPr marL="171450" indent="-171450">
+              <a:buFont typeface="Arial" panose="020B0604020202020204" pitchFamily="34" charset="0"/>
+              <a:buChar char="•"/>
+            </a:pPr>
+            <a:r>
+              <a:rPr lang="en-US" sz="1200" b="0" i="0" kern="1200" dirty="0">
+                <a:solidFill>
+                  <a:schemeClr val="tx1"/>
+                </a:solidFill>
+                <a:effectLst/>
+                <a:latin typeface="+mn-lt"/>
+                <a:ea typeface="+mn-ea"/>
+                <a:cs typeface="+mn-cs"/>
+              </a:rPr>
+              <a:t>The client session is stored on the client. </a:t>
+            </a:r>
+          </a:p>
+          <a:p>
+            <a:pPr marL="171450" indent="-171450">
+              <a:buFont typeface="Arial" panose="020B0604020202020204" pitchFamily="34" charset="0"/>
+              <a:buChar char="•"/>
+            </a:pPr>
+            <a:r>
+              <a:rPr lang="en-US" sz="1200" b="0" i="0" kern="1200" dirty="0">
+                <a:solidFill>
+                  <a:schemeClr val="tx1"/>
+                </a:solidFill>
+                <a:effectLst/>
+                <a:latin typeface="+mn-lt"/>
+                <a:ea typeface="+mn-ea"/>
+                <a:cs typeface="+mn-cs"/>
+              </a:rPr>
+              <a:t>The server is </a:t>
             </a:r>
             <a:r>
               <a:rPr lang="en-US" sz="1200" b="1" i="0" kern="1200" dirty="0">
@@ -4656,7 +4699,7 @@
                 <a:ea typeface="+mn-ea"/>
                 <a:cs typeface="+mn-cs"/>
               </a:rPr>
-              <a:t>stateless</a:t>
+              <a:t>stateless means</a:t>
             </a:r>
             <a:r>
               <a:rPr lang="en-US" sz="1200" b="0" i="0" kern="1200" dirty="0">
@@ -4668,80 +4711,23 @@
                 <a:ea typeface="+mn-ea"/>
                 <a:cs typeface="+mn-cs"/>
               </a:rPr>
-              <a:t> it </a:t>
-            </a:r>
-            <a:r>
-              <a:rPr lang="en-US" sz="1200" b="1" i="0" kern="1200" dirty="0">
-                <a:solidFill>
-                  <a:schemeClr val="tx1"/>
-                </a:solidFill>
-                <a:effectLst/>
-                <a:latin typeface="+mn-lt"/>
-                <a:ea typeface="+mn-ea"/>
-                <a:cs typeface="+mn-cs"/>
-              </a:rPr>
-              <a:t>means</a:t>
-            </a:r>
-            <a:r>
-              <a:rPr lang="en-US" sz="1200" b="0" i="0" kern="1200" dirty="0">
-                <a:solidFill>
-                  <a:schemeClr val="tx1"/>
-                </a:solidFill>
-                <a:effectLst/>
-                <a:latin typeface="+mn-lt"/>
-                <a:ea typeface="+mn-ea"/>
-                <a:cs typeface="+mn-cs"/>
-              </a:rPr>
-              <a:t> that the server does not store any state about the client session on the server side. The client session is stored on the client. The server </a:t>
-            </a:r>
-            <a:r>
-              <a:rPr lang="en-US" sz="1200" b="0" i="0" kern="1200" dirty="0" err="1">
-                <a:solidFill>
-                  <a:schemeClr val="tx1"/>
-                </a:solidFill>
-                <a:effectLst/>
-                <a:latin typeface="+mn-lt"/>
-                <a:ea typeface="+mn-ea"/>
-                <a:cs typeface="+mn-cs"/>
-              </a:rPr>
-              <a:t>is</a:t>
-            </a:r>
-            <a:r>
-              <a:rPr lang="en-US" sz="1200" b="1" i="0" kern="1200" dirty="0" err="1">
-                <a:solidFill>
-                  <a:schemeClr val="tx1"/>
-                </a:solidFill>
-                <a:effectLst/>
-                <a:latin typeface="+mn-lt"/>
-                <a:ea typeface="+mn-ea"/>
-                <a:cs typeface="+mn-cs"/>
-              </a:rPr>
-              <a:t>stateless</a:t>
-            </a:r>
-            <a:r>
-              <a:rPr lang="en-US" sz="1200" b="1" i="0" kern="1200" dirty="0">
-                <a:solidFill>
-                  <a:schemeClr val="tx1"/>
-                </a:solidFill>
-                <a:effectLst/>
-                <a:latin typeface="+mn-lt"/>
-                <a:ea typeface="+mn-ea"/>
-                <a:cs typeface="+mn-cs"/>
-              </a:rPr>
-              <a:t> means</a:t>
-            </a:r>
-            <a:r>
-              <a:rPr lang="en-US" sz="1200" b="0" i="0" kern="1200" dirty="0">
-                <a:solidFill>
-                  <a:schemeClr val="tx1"/>
-                </a:solidFill>
-                <a:effectLst/>
-                <a:latin typeface="+mn-lt"/>
-                <a:ea typeface="+mn-ea"/>
-                <a:cs typeface="+mn-cs"/>
-              </a:rPr>
-              <a:t> that every server can service any client at any time, there is no session affinity or sticky sessions.</a:t>
-            </a:r>
+              <a:t> that every server can service any client at any time</a:t>
+            </a:r>
+          </a:p>
+          <a:p>
+            <a:pPr marL="0" indent="0">
+              <a:buFont typeface="Arial" panose="020B0604020202020204" pitchFamily="34" charset="0"/>
+              <a:buNone/>
+            </a:pPr>
+            <a:endParaRPr lang="en-US" sz="1200" b="0" i="0" kern="1200" dirty="0">
+              <a:solidFill>
+                <a:schemeClr val="tx1"/>
+              </a:solidFill>
+              <a:effectLst/>
+              <a:latin typeface="+mn-lt"/>
+              <a:ea typeface="+mn-ea"/>
+              <a:cs typeface="+mn-cs"/>
+            </a:endParaRPr>
           </a:p>
           <a:p>
             <a:pPr marL="171450" lvl="0" indent="-171450">
@@ -9446,195 +9432,6 @@
 </file>
 
 <file path=ppt/slides/slide11.xml><?xml version="1.0" encoding="utf-8"?>
-<p:sld xmlns:a="http://schemas.openxmlformats.org/drawingml/2006/main" xmlns:r="http://schemas.openxmlformats.org/officeDocument/2006/relationships" xmlns:p="http://schemas.openxmlformats.org/presentationml/2006/main">
-  <p:cSld>
-    <p:spTree>
-      <p:nvGrpSpPr>
-        <p:cNvPr id="1" name=""/>
-        <p:cNvGrpSpPr/>
-        <p:nvPr/>
-      </p:nvGrpSpPr>
-      <p:grpSpPr>
-        <a:xfrm>
-          <a:off x="0" y="0"/>
-          <a:ext cx="0" cy="0"/>
-          <a:chOff x="0" y="0"/>
-          <a:chExt cx="0" cy="0"/>
-        </a:xfrm>
-      </p:grpSpPr>
-      <p:sp>
-        <p:nvSpPr>
-          <p:cNvPr id="3" name="Content Placeholder 2"/>
-          <p:cNvSpPr>
-            <a:spLocks noGrp="1"/>
-          </p:cNvSpPr>
-          <p:nvPr>
-            <p:ph idx="1"/>
-          </p:nvPr>
-        </p:nvSpPr>
-        <p:spPr>
-          <a:xfrm>
-            <a:off x="609600" y="1548358"/>
-            <a:ext cx="11445240" cy="5042942"/>
-          </a:xfrm>
-        </p:spPr>
-        <p:txBody>
-          <a:bodyPr>
-            <a:normAutofit/>
-          </a:bodyPr>
-          <a:lstStyle/>
-          <a:p>
-            <a:r>
-              <a:rPr lang="en-US" dirty="0" err="1">
-                <a:solidFill>
-                  <a:schemeClr val="tx1"/>
-                </a:solidFill>
-              </a:rPr>
-              <a:t>Distributedness</a:t>
-            </a:r>
-            <a:endParaRPr lang="en-US" dirty="0">
-              <a:solidFill>
-                <a:schemeClr val="tx1"/>
-              </a:solidFill>
-            </a:endParaRPr>
-          </a:p>
-          <a:p>
-            <a:r>
-              <a:rPr lang="en-US" dirty="0">
-                <a:solidFill>
-                  <a:schemeClr val="tx1"/>
-                </a:solidFill>
-              </a:rPr>
-              <a:t>Headless</a:t>
-            </a:r>
-          </a:p>
-          <a:p>
-            <a:r>
-              <a:rPr lang="en-US" dirty="0">
-                <a:solidFill>
-                  <a:schemeClr val="tx1"/>
-                </a:solidFill>
-              </a:rPr>
-              <a:t>Lack of transparency</a:t>
-            </a:r>
-          </a:p>
-          <a:p>
-            <a:r>
-              <a:rPr lang="en-US" dirty="0">
-                <a:solidFill>
-                  <a:schemeClr val="tx1"/>
-                </a:solidFill>
-              </a:rPr>
-              <a:t>Loose-coupling</a:t>
-            </a:r>
-          </a:p>
-          <a:p>
-            <a:r>
-              <a:rPr lang="en-US" dirty="0">
-                <a:solidFill>
-                  <a:schemeClr val="tx1"/>
-                </a:solidFill>
-              </a:rPr>
-              <a:t>Lack of reliability of WWW as a common communication framework</a:t>
-            </a:r>
-          </a:p>
-          <a:p>
-            <a:r>
-              <a:rPr lang="en-US" dirty="0">
-                <a:solidFill>
-                  <a:schemeClr val="tx1"/>
-                </a:solidFill>
-              </a:rPr>
-              <a:t>3</a:t>
-            </a:r>
-            <a:r>
-              <a:rPr lang="en-US" baseline="30000" dirty="0">
-                <a:solidFill>
-                  <a:schemeClr val="tx1"/>
-                </a:solidFill>
-              </a:rPr>
-              <a:t>rd</a:t>
-            </a:r>
-            <a:r>
-              <a:rPr lang="en-US" dirty="0">
-                <a:solidFill>
-                  <a:schemeClr val="tx1"/>
-                </a:solidFill>
-              </a:rPr>
-              <a:t> party </a:t>
-            </a:r>
-            <a:r>
-              <a:rPr lang="en-US" dirty="0" err="1">
-                <a:solidFill>
-                  <a:schemeClr val="tx1"/>
-                </a:solidFill>
-              </a:rPr>
-              <a:t>w.s</a:t>
-            </a:r>
-            <a:r>
-              <a:rPr lang="en-US" dirty="0">
-                <a:solidFill>
-                  <a:schemeClr val="tx1"/>
-                </a:solidFill>
-              </a:rPr>
-              <a:t>. and applications makes testing more complicated</a:t>
-            </a:r>
-          </a:p>
-        </p:txBody>
-      </p:sp>
-      <p:sp>
-        <p:nvSpPr>
-          <p:cNvPr id="2" name="Title 1"/>
-          <p:cNvSpPr>
-            <a:spLocks noGrp="1"/>
-          </p:cNvSpPr>
-          <p:nvPr>
-            <p:ph type="title"/>
-          </p:nvPr>
-        </p:nvSpPr>
-        <p:spPr>
-          <a:xfrm>
-            <a:off x="609600" y="266700"/>
-            <a:ext cx="10972800" cy="1066800"/>
-          </a:xfrm>
-        </p:spPr>
-        <p:txBody>
-          <a:bodyPr/>
-          <a:lstStyle/>
-          <a:p>
-            <a:r>
-              <a:rPr lang="en-US" dirty="0">
-                <a:solidFill>
-                  <a:srgbClr val="002E8A"/>
-                </a:solidFill>
-              </a:rPr>
-              <a:t>Testing challenges in REST</a:t>
-            </a:r>
-          </a:p>
-        </p:txBody>
-      </p:sp>
-    </p:spTree>
-    <p:extLst>
-      <p:ext uri="{BB962C8B-B14F-4D97-AF65-F5344CB8AC3E}">
-        <p14:creationId xmlns:p14="http://schemas.microsoft.com/office/powerpoint/2010/main" val="2150694668"/>
-      </p:ext>
-    </p:extLst>
-  </p:cSld>
-  <p:clrMapOvr>
-    <a:masterClrMapping/>
-  </p:clrMapOvr>
-  <mc:AlternateContent xmlns:mc="http://schemas.openxmlformats.org/markup-compatibility/2006" xmlns:p14="http://schemas.microsoft.com/office/powerpoint/2010/main">
-    <mc:Choice Requires="p14">
-      <p:transition p14:dur="10"/>
-    </mc:Choice>
-    <mc:Fallback xmlns="">
-      <p:transition/>
-    </mc:Fallback>
-  </mc:AlternateContent>
-</p:sld>
-</file>
-
-<file path=ppt/slides/slide12.xml><?xml version="1.0" encoding="utf-8"?>
 <p:sld xmlns:a="http://schemas.openxmlformats.org/drawingml/2006/main" xmlns:r="http://schemas.openxmlformats.org/officeDocument/2006/relationships" xmlns:p="http://schemas.openxmlformats.org/presentationml/2006/main">
   <p:cSld>
     <p:spTree>
@@ -10506,7 +10303,7 @@
 </p:sld>
 </file>
 
-<file path=ppt/slides/slide13.xml><?xml version="1.0" encoding="utf-8"?>
+<file path=ppt/slides/slide12.xml><?xml version="1.0" encoding="utf-8"?>
 <p:sld xmlns:a="http://schemas.openxmlformats.org/drawingml/2006/main" xmlns:r="http://schemas.openxmlformats.org/officeDocument/2006/relationships" xmlns:p="http://schemas.openxmlformats.org/presentationml/2006/main">
   <p:cSld>
     <p:spTree>
@@ -10662,7 +10459,7 @@
 </p:sld>
 </file>
 
-<file path=ppt/slides/slide14.xml><?xml version="1.0" encoding="utf-8"?>
+<file path=ppt/slides/slide13.xml><?xml version="1.0" encoding="utf-8"?>
 <p:sld xmlns:a="http://schemas.openxmlformats.org/drawingml/2006/main" xmlns:r="http://schemas.openxmlformats.org/officeDocument/2006/relationships" xmlns:p="http://schemas.openxmlformats.org/presentationml/2006/main">
   <p:cSld>
     <p:spTree>
@@ -10989,7 +10786,7 @@
 </p:sld>
 </file>
 
-<file path=ppt/slides/slide15.xml><?xml version="1.0" encoding="utf-8"?>
+<file path=ppt/slides/slide14.xml><?xml version="1.0" encoding="utf-8"?>
 <p:sld xmlns:a="http://schemas.openxmlformats.org/drawingml/2006/main" xmlns:r="http://schemas.openxmlformats.org/officeDocument/2006/relationships" xmlns:p="http://schemas.openxmlformats.org/presentationml/2006/main">
   <p:cSld>
     <p:spTree>
@@ -11817,7 +11614,7 @@
 </p:sld>
 </file>
 
-<file path=ppt/slides/slide16.xml><?xml version="1.0" encoding="utf-8"?>
+<file path=ppt/slides/slide15.xml><?xml version="1.0" encoding="utf-8"?>
 <p:sld xmlns:a="http://schemas.openxmlformats.org/drawingml/2006/main" xmlns:r="http://schemas.openxmlformats.org/officeDocument/2006/relationships" xmlns:p="http://schemas.openxmlformats.org/presentationml/2006/main">
   <p:cSld>
     <p:spTree>
@@ -12573,7 +12370,7 @@
 </p:sld>
 </file>
 
-<file path=ppt/slides/slide17.xml><?xml version="1.0" encoding="utf-8"?>
+<file path=ppt/slides/slide16.xml><?xml version="1.0" encoding="utf-8"?>
 <p:sld xmlns:a="http://schemas.openxmlformats.org/drawingml/2006/main" xmlns:r="http://schemas.openxmlformats.org/officeDocument/2006/relationships" xmlns:p="http://schemas.openxmlformats.org/presentationml/2006/main">
   <p:cSld>
     <p:spTree>
@@ -13727,7 +13524,7 @@
 </p:sld>
 </file>
 
-<file path=ppt/slides/slide18.xml><?xml version="1.0" encoding="utf-8"?>
+<file path=ppt/slides/slide17.xml><?xml version="1.0" encoding="utf-8"?>
 <p:sld xmlns:a="http://schemas.openxmlformats.org/drawingml/2006/main" xmlns:r="http://schemas.openxmlformats.org/officeDocument/2006/relationships" xmlns:p="http://schemas.openxmlformats.org/presentationml/2006/main">
   <p:cSld>
     <p:spTree>
@@ -14330,7 +14127,7 @@
 </p:sld>
 </file>
 
-<file path=ppt/slides/slide19.xml><?xml version="1.0" encoding="utf-8"?>
+<file path=ppt/slides/slide18.xml><?xml version="1.0" encoding="utf-8"?>
 <p:sld xmlns:a="http://schemas.openxmlformats.org/drawingml/2006/main" xmlns:r="http://schemas.openxmlformats.org/officeDocument/2006/relationships" xmlns:p="http://schemas.openxmlformats.org/presentationml/2006/main">
   <p:cSld>
     <p:spTree>
@@ -14959,230 +14756,7 @@
 </p:sld>
 </file>
 
-<file path=ppt/slides/slide2.xml><?xml version="1.0" encoding="utf-8"?>
-<p:sld xmlns:a="http://schemas.openxmlformats.org/drawingml/2006/main" xmlns:r="http://schemas.openxmlformats.org/officeDocument/2006/relationships" xmlns:p="http://schemas.openxmlformats.org/presentationml/2006/main">
-  <p:cSld>
-    <p:spTree>
-      <p:nvGrpSpPr>
-        <p:cNvPr id="1" name=""/>
-        <p:cNvGrpSpPr/>
-        <p:nvPr/>
-      </p:nvGrpSpPr>
-      <p:grpSpPr>
-        <a:xfrm>
-          <a:off x="0" y="0"/>
-          <a:ext cx="0" cy="0"/>
-          <a:chOff x="0" y="0"/>
-          <a:chExt cx="0" cy="0"/>
-        </a:xfrm>
-      </p:grpSpPr>
-      <p:sp>
-        <p:nvSpPr>
-          <p:cNvPr id="3" name="Content Placeholder 2"/>
-          <p:cNvSpPr>
-            <a:spLocks noGrp="1"/>
-          </p:cNvSpPr>
-          <p:nvPr>
-            <p:ph idx="1"/>
-          </p:nvPr>
-        </p:nvSpPr>
-        <p:spPr>
-          <a:xfrm>
-            <a:off x="609600" y="1548358"/>
-            <a:ext cx="11445240" cy="5042942"/>
-          </a:xfrm>
-        </p:spPr>
-        <p:txBody>
-          <a:bodyPr>
-            <a:normAutofit/>
-          </a:bodyPr>
-          <a:lstStyle/>
-          <a:p>
-            <a:r>
-              <a:rPr lang="en-US" dirty="0">
-                <a:solidFill>
-                  <a:schemeClr val="tx1"/>
-                </a:solidFill>
-              </a:rPr>
-              <a:t>Background</a:t>
-            </a:r>
-          </a:p>
-          <a:p>
-            <a:endParaRPr lang="en-US" dirty="0">
-              <a:solidFill>
-                <a:schemeClr val="tx1"/>
-              </a:solidFill>
-            </a:endParaRPr>
-          </a:p>
-          <a:p>
-            <a:r>
-              <a:rPr lang="en-US" dirty="0">
-                <a:solidFill>
-                  <a:schemeClr val="tx1"/>
-                </a:solidFill>
-              </a:rPr>
-              <a:t>Test-the-rest: An approach to testing RESTful web services[4]</a:t>
-            </a:r>
-          </a:p>
-          <a:p>
-            <a:r>
-              <a:rPr lang="en-US" dirty="0">
-                <a:solidFill>
-                  <a:schemeClr val="tx1"/>
-                </a:solidFill>
-              </a:rPr>
-              <a:t>Connectedness testing of RESTful </a:t>
-            </a:r>
-            <a:r>
-              <a:rPr lang="en-US" dirty="0" err="1">
-                <a:solidFill>
-                  <a:schemeClr val="tx1"/>
-                </a:solidFill>
-              </a:rPr>
-              <a:t>w.s</a:t>
-            </a:r>
-            <a:r>
-              <a:rPr lang="en-US" dirty="0">
-                <a:solidFill>
-                  <a:schemeClr val="tx1"/>
-                </a:solidFill>
-              </a:rPr>
-              <a:t>. [6]</a:t>
-            </a:r>
-          </a:p>
-          <a:p>
-            <a:r>
-              <a:rPr lang="en-US" dirty="0">
-                <a:solidFill>
-                  <a:schemeClr val="tx1"/>
-                </a:solidFill>
-              </a:rPr>
-              <a:t>Model-based testing of RESTful </a:t>
-            </a:r>
-            <a:r>
-              <a:rPr lang="en-US" dirty="0" err="1">
-                <a:solidFill>
-                  <a:schemeClr val="tx1"/>
-                </a:solidFill>
-              </a:rPr>
-              <a:t>w.s</a:t>
-            </a:r>
-            <a:r>
-              <a:rPr lang="en-US" dirty="0">
-                <a:solidFill>
-                  <a:schemeClr val="tx1"/>
-                </a:solidFill>
-              </a:rPr>
-              <a:t>. using UML protocol state machines[7]</a:t>
-            </a:r>
-          </a:p>
-          <a:p>
-            <a:r>
-              <a:rPr lang="en-US" dirty="0">
-                <a:solidFill>
-                  <a:schemeClr val="tx1"/>
-                </a:solidFill>
-              </a:rPr>
-              <a:t>REST service testing based on inferred XML schemas[8]</a:t>
-            </a:r>
-          </a:p>
-          <a:p>
-            <a:r>
-              <a:rPr lang="en-US" dirty="0">
-                <a:solidFill>
-                  <a:schemeClr val="tx1"/>
-                </a:solidFill>
-              </a:rPr>
-              <a:t>RESTful API automated test case generation[9]</a:t>
-            </a:r>
-          </a:p>
-          <a:p>
-            <a:endParaRPr lang="en-US" dirty="0">
-              <a:solidFill>
-                <a:schemeClr val="tx1"/>
-              </a:solidFill>
-            </a:endParaRPr>
-          </a:p>
-          <a:p>
-            <a:r>
-              <a:rPr lang="en-US" dirty="0">
-                <a:solidFill>
-                  <a:schemeClr val="tx1"/>
-                </a:solidFill>
-              </a:rPr>
-              <a:t>Summary</a:t>
-            </a:r>
-          </a:p>
-          <a:p>
-            <a:r>
-              <a:rPr lang="en-US" dirty="0">
-                <a:solidFill>
-                  <a:schemeClr val="tx1"/>
-                </a:solidFill>
-              </a:rPr>
-              <a:t>Conclusion</a:t>
-            </a:r>
-          </a:p>
-        </p:txBody>
-      </p:sp>
-      <p:sp>
-        <p:nvSpPr>
-          <p:cNvPr id="2" name="Title 1"/>
-          <p:cNvSpPr>
-            <a:spLocks noGrp="1"/>
-          </p:cNvSpPr>
-          <p:nvPr>
-            <p:ph type="title"/>
-          </p:nvPr>
-        </p:nvSpPr>
-        <p:spPr>
-          <a:xfrm>
-            <a:off x="609600" y="266700"/>
-            <a:ext cx="10972800" cy="1066800"/>
-          </a:xfrm>
-        </p:spPr>
-        <p:txBody>
-          <a:bodyPr/>
-          <a:lstStyle/>
-          <a:p>
-            <a:r>
-              <a:rPr lang="tr-TR" dirty="0">
-                <a:solidFill>
-                  <a:srgbClr val="002E8A"/>
-                </a:solidFill>
-              </a:rPr>
-              <a:t>Outline</a:t>
-            </a:r>
-            <a:endParaRPr lang="en-US" dirty="0">
-              <a:solidFill>
-                <a:srgbClr val="002E8A"/>
-              </a:solidFill>
-            </a:endParaRPr>
-          </a:p>
-        </p:txBody>
-      </p:sp>
-    </p:spTree>
-    <p:extLst>
-      <p:ext uri="{BB962C8B-B14F-4D97-AF65-F5344CB8AC3E}">
-        <p14:creationId xmlns:p14="http://schemas.microsoft.com/office/powerpoint/2010/main" val="1851896080"/>
-      </p:ext>
-    </p:extLst>
-  </p:cSld>
-  <p:clrMapOvr>
-    <a:masterClrMapping/>
-  </p:clrMapOvr>
-  <mc:AlternateContent xmlns:mc="http://schemas.openxmlformats.org/markup-compatibility/2006" xmlns:p14="http://schemas.microsoft.com/office/powerpoint/2010/main">
-    <mc:Choice Requires="p14">
-      <p:transition p14:dur="10"/>
-    </mc:Choice>
-    <mc:Fallback xmlns="">
-      <p:transition/>
-    </mc:Fallback>
-  </mc:AlternateContent>
-</p:sld>
-</file>
-
-<file path=ppt/slides/slide20.xml><?xml version="1.0" encoding="utf-8"?>
+<file path=ppt/slides/slide19.xml><?xml version="1.0" encoding="utf-8"?>
 <p:sld xmlns:a="http://schemas.openxmlformats.org/drawingml/2006/main" xmlns:r="http://schemas.openxmlformats.org/officeDocument/2006/relationships" xmlns:p="http://schemas.openxmlformats.org/presentationml/2006/main">
   <p:cSld>
     <p:spTree>
@@ -15723,7 +15297,230 @@
 </p:sld>
 </file>
 
-<file path=ppt/slides/slide21.xml><?xml version="1.0" encoding="utf-8"?>
+<file path=ppt/slides/slide2.xml><?xml version="1.0" encoding="utf-8"?>
+<p:sld xmlns:a="http://schemas.openxmlformats.org/drawingml/2006/main" xmlns:r="http://schemas.openxmlformats.org/officeDocument/2006/relationships" xmlns:p="http://schemas.openxmlformats.org/presentationml/2006/main">
+  <p:cSld>
+    <p:spTree>
+      <p:nvGrpSpPr>
+        <p:cNvPr id="1" name=""/>
+        <p:cNvGrpSpPr/>
+        <p:nvPr/>
+      </p:nvGrpSpPr>
+      <p:grpSpPr>
+        <a:xfrm>
+          <a:off x="0" y="0"/>
+          <a:ext cx="0" cy="0"/>
+          <a:chOff x="0" y="0"/>
+          <a:chExt cx="0" cy="0"/>
+        </a:xfrm>
+      </p:grpSpPr>
+      <p:sp>
+        <p:nvSpPr>
+          <p:cNvPr id="3" name="Content Placeholder 2"/>
+          <p:cNvSpPr>
+            <a:spLocks noGrp="1"/>
+          </p:cNvSpPr>
+          <p:nvPr>
+            <p:ph idx="1"/>
+          </p:nvPr>
+        </p:nvSpPr>
+        <p:spPr>
+          <a:xfrm>
+            <a:off x="609600" y="1548358"/>
+            <a:ext cx="11445240" cy="5042942"/>
+          </a:xfrm>
+        </p:spPr>
+        <p:txBody>
+          <a:bodyPr>
+            <a:normAutofit/>
+          </a:bodyPr>
+          <a:lstStyle/>
+          <a:p>
+            <a:r>
+              <a:rPr lang="en-US" dirty="0">
+                <a:solidFill>
+                  <a:schemeClr val="tx1"/>
+                </a:solidFill>
+              </a:rPr>
+              <a:t>Background</a:t>
+            </a:r>
+          </a:p>
+          <a:p>
+            <a:endParaRPr lang="en-US" dirty="0">
+              <a:solidFill>
+                <a:schemeClr val="tx1"/>
+              </a:solidFill>
+            </a:endParaRPr>
+          </a:p>
+          <a:p>
+            <a:r>
+              <a:rPr lang="en-US" dirty="0">
+                <a:solidFill>
+                  <a:schemeClr val="tx1"/>
+                </a:solidFill>
+              </a:rPr>
+              <a:t>Test-the-rest: An approach to testing RESTful web services[4]</a:t>
+            </a:r>
+          </a:p>
+          <a:p>
+            <a:r>
+              <a:rPr lang="en-US" dirty="0">
+                <a:solidFill>
+                  <a:schemeClr val="tx1"/>
+                </a:solidFill>
+              </a:rPr>
+              <a:t>Connectedness testing of RESTful </a:t>
+            </a:r>
+            <a:r>
+              <a:rPr lang="en-US" dirty="0" err="1">
+                <a:solidFill>
+                  <a:schemeClr val="tx1"/>
+                </a:solidFill>
+              </a:rPr>
+              <a:t>w.s</a:t>
+            </a:r>
+            <a:r>
+              <a:rPr lang="en-US" dirty="0">
+                <a:solidFill>
+                  <a:schemeClr val="tx1"/>
+                </a:solidFill>
+              </a:rPr>
+              <a:t>. [6]</a:t>
+            </a:r>
+          </a:p>
+          <a:p>
+            <a:r>
+              <a:rPr lang="en-US" dirty="0">
+                <a:solidFill>
+                  <a:schemeClr val="tx1"/>
+                </a:solidFill>
+              </a:rPr>
+              <a:t>Model-based testing of RESTful </a:t>
+            </a:r>
+            <a:r>
+              <a:rPr lang="en-US" dirty="0" err="1">
+                <a:solidFill>
+                  <a:schemeClr val="tx1"/>
+                </a:solidFill>
+              </a:rPr>
+              <a:t>w.s</a:t>
+            </a:r>
+            <a:r>
+              <a:rPr lang="en-US" dirty="0">
+                <a:solidFill>
+                  <a:schemeClr val="tx1"/>
+                </a:solidFill>
+              </a:rPr>
+              <a:t>. using UML protocol state machines[7]</a:t>
+            </a:r>
+          </a:p>
+          <a:p>
+            <a:r>
+              <a:rPr lang="en-US" dirty="0">
+                <a:solidFill>
+                  <a:schemeClr val="tx1"/>
+                </a:solidFill>
+              </a:rPr>
+              <a:t>REST service testing based on inferred XML schemas[8]</a:t>
+            </a:r>
+          </a:p>
+          <a:p>
+            <a:r>
+              <a:rPr lang="en-US" dirty="0">
+                <a:solidFill>
+                  <a:schemeClr val="tx1"/>
+                </a:solidFill>
+              </a:rPr>
+              <a:t>RESTful API automated test case generation[9]</a:t>
+            </a:r>
+          </a:p>
+          <a:p>
+            <a:endParaRPr lang="en-US" dirty="0">
+              <a:solidFill>
+                <a:schemeClr val="tx1"/>
+              </a:solidFill>
+            </a:endParaRPr>
+          </a:p>
+          <a:p>
+            <a:r>
+              <a:rPr lang="en-US" dirty="0">
+                <a:solidFill>
+                  <a:schemeClr val="tx1"/>
+                </a:solidFill>
+              </a:rPr>
+              <a:t>Summary</a:t>
+            </a:r>
+          </a:p>
+          <a:p>
+            <a:r>
+              <a:rPr lang="en-US" dirty="0">
+                <a:solidFill>
+                  <a:schemeClr val="tx1"/>
+                </a:solidFill>
+              </a:rPr>
+              <a:t>Conclusion</a:t>
+            </a:r>
+          </a:p>
+        </p:txBody>
+      </p:sp>
+      <p:sp>
+        <p:nvSpPr>
+          <p:cNvPr id="2" name="Title 1"/>
+          <p:cNvSpPr>
+            <a:spLocks noGrp="1"/>
+          </p:cNvSpPr>
+          <p:nvPr>
+            <p:ph type="title"/>
+          </p:nvPr>
+        </p:nvSpPr>
+        <p:spPr>
+          <a:xfrm>
+            <a:off x="609600" y="266700"/>
+            <a:ext cx="10972800" cy="1066800"/>
+          </a:xfrm>
+        </p:spPr>
+        <p:txBody>
+          <a:bodyPr/>
+          <a:lstStyle/>
+          <a:p>
+            <a:r>
+              <a:rPr lang="tr-TR" dirty="0">
+                <a:solidFill>
+                  <a:srgbClr val="002E8A"/>
+                </a:solidFill>
+              </a:rPr>
+              <a:t>Outline</a:t>
+            </a:r>
+            <a:endParaRPr lang="en-US" dirty="0">
+              <a:solidFill>
+                <a:srgbClr val="002E8A"/>
+              </a:solidFill>
+            </a:endParaRPr>
+          </a:p>
+        </p:txBody>
+      </p:sp>
+    </p:spTree>
+    <p:extLst>
+      <p:ext uri="{BB962C8B-B14F-4D97-AF65-F5344CB8AC3E}">
+        <p14:creationId xmlns:p14="http://schemas.microsoft.com/office/powerpoint/2010/main" val="1851896080"/>
+      </p:ext>
+    </p:extLst>
+  </p:cSld>
+  <p:clrMapOvr>
+    <a:masterClrMapping/>
+  </p:clrMapOvr>
+  <mc:AlternateContent xmlns:mc="http://schemas.openxmlformats.org/markup-compatibility/2006" xmlns:p14="http://schemas.microsoft.com/office/powerpoint/2010/main">
+    <mc:Choice Requires="p14">
+      <p:transition p14:dur="10"/>
+    </mc:Choice>
+    <mc:Fallback xmlns="">
+      <p:transition/>
+    </mc:Fallback>
+  </mc:AlternateContent>
+</p:sld>
+</file>
+
+<file path=ppt/slides/slide20.xml><?xml version="1.0" encoding="utf-8"?>
 <p:sld xmlns:a="http://schemas.openxmlformats.org/drawingml/2006/main" xmlns:r="http://schemas.openxmlformats.org/officeDocument/2006/relationships" xmlns:p="http://schemas.openxmlformats.org/presentationml/2006/main">
   <p:cSld>
     <p:spTree>
@@ -16058,7 +15855,7 @@
 </p:sld>
 </file>
 
-<file path=ppt/slides/slide22.xml><?xml version="1.0" encoding="utf-8"?>
+<file path=ppt/slides/slide21.xml><?xml version="1.0" encoding="utf-8"?>
 <p:sld xmlns:a="http://schemas.openxmlformats.org/drawingml/2006/main" xmlns:r="http://schemas.openxmlformats.org/officeDocument/2006/relationships" xmlns:p="http://schemas.openxmlformats.org/presentationml/2006/main">
   <p:cSld>
     <p:spTree>
@@ -16876,7 +16673,7 @@
 </p:sld>
 </file>
 
-<file path=ppt/slides/slide23.xml><?xml version="1.0" encoding="utf-8"?>
+<file path=ppt/slides/slide22.xml><?xml version="1.0" encoding="utf-8"?>
 <p:sld xmlns:a="http://schemas.openxmlformats.org/drawingml/2006/main" xmlns:r="http://schemas.openxmlformats.org/officeDocument/2006/relationships" xmlns:p="http://schemas.openxmlformats.org/presentationml/2006/main">
   <p:cSld>
     <p:spTree>
@@ -18168,7 +17965,7 @@
 </p:sld>
 </file>
 
-<file path=ppt/slides/slide24.xml><?xml version="1.0" encoding="utf-8"?>
+<file path=ppt/slides/slide23.xml><?xml version="1.0" encoding="utf-8"?>
 <p:sld xmlns:a="http://schemas.openxmlformats.org/drawingml/2006/main" xmlns:r="http://schemas.openxmlformats.org/officeDocument/2006/relationships" xmlns:p="http://schemas.openxmlformats.org/presentationml/2006/main">
   <p:cSld>
     <p:spTree>
@@ -18351,7 +18148,7 @@
 </p:sld>
 </file>
 
-<file path=ppt/slides/slide25.xml><?xml version="1.0" encoding="utf-8"?>
+<file path=ppt/slides/slide24.xml><?xml version="1.0" encoding="utf-8"?>
 <p:sld xmlns:a="http://schemas.openxmlformats.org/drawingml/2006/main" xmlns:r="http://schemas.openxmlformats.org/officeDocument/2006/relationships" xmlns:p="http://schemas.openxmlformats.org/presentationml/2006/main">
   <p:cSld>
     <p:spTree>
@@ -19313,7 +19110,7 @@
 </p:sld>
 </file>
 
-<file path=ppt/slides/slide26.xml><?xml version="1.0" encoding="utf-8"?>
+<file path=ppt/slides/slide25.xml><?xml version="1.0" encoding="utf-8"?>
 <p:sld xmlns:a="http://schemas.openxmlformats.org/drawingml/2006/main" xmlns:r="http://schemas.openxmlformats.org/officeDocument/2006/relationships" xmlns:p="http://schemas.openxmlformats.org/presentationml/2006/main">
   <p:cSld>
     <p:spTree>
@@ -20661,7 +20458,7 @@
 </p:sld>
 </file>
 
-<file path=ppt/slides/slide27.xml><?xml version="1.0" encoding="utf-8"?>
+<file path=ppt/slides/slide26.xml><?xml version="1.0" encoding="utf-8"?>
 <p:sld xmlns:a="http://schemas.openxmlformats.org/drawingml/2006/main" xmlns:r="http://schemas.openxmlformats.org/officeDocument/2006/relationships" xmlns:p="http://schemas.openxmlformats.org/presentationml/2006/main">
   <p:cSld>
     <p:spTree>
@@ -20878,7 +20675,7 @@
 </p:sld>
 </file>
 
-<file path=ppt/slides/slide28.xml><?xml version="1.0" encoding="utf-8"?>
+<file path=ppt/slides/slide27.xml><?xml version="1.0" encoding="utf-8"?>
 <p:sld xmlns:a="http://schemas.openxmlformats.org/drawingml/2006/main" xmlns:r="http://schemas.openxmlformats.org/officeDocument/2006/relationships" xmlns:p="http://schemas.openxmlformats.org/presentationml/2006/main">
   <p:cSld>
     <p:spTree>
@@ -21071,11 +20868,11 @@
   <p:clrMapOvr>
     <a:masterClrMapping/>
   </p:clrMapOvr>
-  <mc:AlternateContent xmlns:mc="http://schemas.openxmlformats.org/markup-compatibility/2006">
-    <mc:Choice xmlns:p14="http://schemas.microsoft.com/office/powerpoint/2010/main" Requires="p14">
+  <mc:AlternateContent xmlns:mc="http://schemas.openxmlformats.org/markup-compatibility/2006" xmlns:p14="http://schemas.microsoft.com/office/powerpoint/2010/main">
+    <mc:Choice Requires="p14">
       <p:transition p14:dur="10"/>
     </mc:Choice>
-    <mc:Fallback>
+    <mc:Fallback xmlns="">
       <p:transition/>
     </mc:Fallback>
   </mc:AlternateContent>
@@ -21583,7 +21380,7 @@
 </p:sld>
 </file>
 
-<file path=ppt/slides/slide29.xml><?xml version="1.0" encoding="utf-8"?>
+<file path=ppt/slides/slide28.xml><?xml version="1.0" encoding="utf-8"?>
 <p:sld xmlns:a="http://schemas.openxmlformats.org/drawingml/2006/main" xmlns:r="http://schemas.openxmlformats.org/officeDocument/2006/relationships" xmlns:p="http://schemas.openxmlformats.org/presentationml/2006/main">
   <p:cSld>
     <p:spTree>
@@ -22806,6 +22603,155 @@
 </p:sld>
 </file>
 
+<file path=ppt/slides/slide29.xml><?xml version="1.0" encoding="utf-8"?>
+<p:sld xmlns:a="http://schemas.openxmlformats.org/drawingml/2006/main" xmlns:r="http://schemas.openxmlformats.org/officeDocument/2006/relationships" xmlns:p="http://schemas.openxmlformats.org/presentationml/2006/main">
+  <p:cSld>
+    <p:spTree>
+      <p:nvGrpSpPr>
+        <p:cNvPr id="1" name=""/>
+        <p:cNvGrpSpPr/>
+        <p:nvPr/>
+      </p:nvGrpSpPr>
+      <p:grpSpPr>
+        <a:xfrm>
+          <a:off x="0" y="0"/>
+          <a:ext cx="0" cy="0"/>
+          <a:chOff x="0" y="0"/>
+          <a:chExt cx="0" cy="0"/>
+        </a:xfrm>
+      </p:grpSpPr>
+      <p:sp>
+        <p:nvSpPr>
+          <p:cNvPr id="2" name="Title 1"/>
+          <p:cNvSpPr>
+            <a:spLocks noGrp="1"/>
+          </p:cNvSpPr>
+          <p:nvPr>
+            <p:ph type="title"/>
+          </p:nvPr>
+        </p:nvSpPr>
+        <p:spPr>
+          <a:xfrm>
+            <a:off x="609600" y="266700"/>
+            <a:ext cx="10972800" cy="1066800"/>
+          </a:xfrm>
+        </p:spPr>
+        <p:txBody>
+          <a:bodyPr>
+            <a:normAutofit/>
+          </a:bodyPr>
+          <a:lstStyle/>
+          <a:p>
+            <a:r>
+              <a:rPr lang="en-US" dirty="0">
+                <a:solidFill>
+                  <a:srgbClr val="002E8A"/>
+                </a:solidFill>
+              </a:rPr>
+              <a:t>RESTful API automated test case generation[9]</a:t>
+            </a:r>
+          </a:p>
+        </p:txBody>
+      </p:sp>
+      <p:pic>
+        <p:nvPicPr>
+          <p:cNvPr id="9" name="Picture 8" descr="Screen Clipping">
+            <a:extLst>
+              <a:ext uri="{FF2B5EF4-FFF2-40B4-BE49-F238E27FC236}">
+                <a16:creationId xmlns:a16="http://schemas.microsoft.com/office/drawing/2014/main" id="{4340F2FB-45A2-45D1-B8FF-7648E264C8BD}"/>
+              </a:ext>
+            </a:extLst>
+          </p:cNvPr>
+          <p:cNvPicPr>
+            <a:picLocks noChangeAspect="1"/>
+          </p:cNvPicPr>
+          <p:nvPr/>
+        </p:nvPicPr>
+        <p:blipFill rotWithShape="1">
+          <a:blip r:embed="rId3">
+            <a:extLst>
+              <a:ext uri="{28A0092B-C50C-407E-A947-70E740481C1C}">
+                <a14:useLocalDpi xmlns:a14="http://schemas.microsoft.com/office/drawing/2010/main" val="0"/>
+              </a:ext>
+            </a:extLst>
+          </a:blip>
+          <a:srcRect l="14201" t="42647" r="15065" b="2584"/>
+          <a:stretch/>
+        </p:blipFill>
+        <p:spPr>
+          <a:xfrm>
+            <a:off x="149805" y="2564606"/>
+            <a:ext cx="11892389" cy="1728788"/>
+          </a:xfrm>
+          <a:prstGeom prst="rect">
+            <a:avLst/>
+          </a:prstGeom>
+        </p:spPr>
+      </p:pic>
+      <p:sp>
+        <p:nvSpPr>
+          <p:cNvPr id="11" name="TextBox 10">
+            <a:extLst>
+              <a:ext uri="{FF2B5EF4-FFF2-40B4-BE49-F238E27FC236}">
+                <a16:creationId xmlns:a16="http://schemas.microsoft.com/office/drawing/2014/main" id="{5DD3647C-2C60-4E18-95B9-0B4CFA3C2068}"/>
+              </a:ext>
+            </a:extLst>
+          </p:cNvPr>
+          <p:cNvSpPr txBox="1"/>
+          <p:nvPr/>
+        </p:nvSpPr>
+        <p:spPr>
+          <a:xfrm>
+            <a:off x="2085975" y="4500563"/>
+            <a:ext cx="7431201" cy="369332"/>
+          </a:xfrm>
+          <a:prstGeom prst="rect">
+            <a:avLst/>
+          </a:prstGeom>
+          <a:noFill/>
+        </p:spPr>
+        <p:txBody>
+          <a:bodyPr wrap="none" rtlCol="0">
+            <a:spAutoFit/>
+          </a:bodyPr>
+          <a:lstStyle/>
+          <a:p>
+            <a:r>
+              <a:rPr lang="en-US" dirty="0"/>
+              <a:t>Three open source </a:t>
+            </a:r>
+            <a:r>
+              <a:rPr lang="en-US" dirty="0" err="1"/>
+              <a:t>w.s</a:t>
+            </a:r>
+            <a:r>
+              <a:rPr lang="en-US" dirty="0"/>
+              <a:t>. chosen for experimental evaluation of the method [9]</a:t>
+            </a:r>
+          </a:p>
+        </p:txBody>
+      </p:sp>
+    </p:spTree>
+    <p:extLst>
+      <p:ext uri="{BB962C8B-B14F-4D97-AF65-F5344CB8AC3E}">
+        <p14:creationId xmlns:p14="http://schemas.microsoft.com/office/powerpoint/2010/main" val="3950552121"/>
+      </p:ext>
+    </p:extLst>
+  </p:cSld>
+  <p:clrMapOvr>
+    <a:masterClrMapping/>
+  </p:clrMapOvr>
+  <mc:AlternateContent xmlns:mc="http://schemas.openxmlformats.org/markup-compatibility/2006" xmlns:p14="http://schemas.microsoft.com/office/powerpoint/2010/main">
+    <mc:Choice Requires="p14">
+      <p:transition p14:dur="10"/>
+    </mc:Choice>
+    <mc:Fallback xmlns="">
+      <p:transition/>
+    </mc:Fallback>
+  </mc:AlternateContent>
+</p:sld>
+</file>
+
 <file path=ppt/slides/slide3.xml><?xml version="1.0" encoding="utf-8"?>
 <p:sld xmlns:a="http://schemas.openxmlformats.org/drawingml/2006/main" xmlns:r="http://schemas.openxmlformats.org/officeDocument/2006/relationships" xmlns:p="http://schemas.openxmlformats.org/presentationml/2006/main">
   <p:cSld>
@@ -23304,155 +23250,6 @@
           </a:p>
         </p:txBody>
       </p:sp>
-      <p:pic>
-        <p:nvPicPr>
-          <p:cNvPr id="9" name="Picture 8" descr="Screen Clipping">
-            <a:extLst>
-              <a:ext uri="{FF2B5EF4-FFF2-40B4-BE49-F238E27FC236}">
-                <a16:creationId xmlns:a16="http://schemas.microsoft.com/office/drawing/2014/main" id="{4340F2FB-45A2-45D1-B8FF-7648E264C8BD}"/>
-              </a:ext>
-            </a:extLst>
-          </p:cNvPr>
-          <p:cNvPicPr>
-            <a:picLocks noChangeAspect="1"/>
-          </p:cNvPicPr>
-          <p:nvPr/>
-        </p:nvPicPr>
-        <p:blipFill rotWithShape="1">
-          <a:blip r:embed="rId3">
-            <a:extLst>
-              <a:ext uri="{28A0092B-C50C-407E-A947-70E740481C1C}">
-                <a14:useLocalDpi xmlns:a14="http://schemas.microsoft.com/office/drawing/2010/main" val="0"/>
-              </a:ext>
-            </a:extLst>
-          </a:blip>
-          <a:srcRect l="14201" t="42647" r="15065" b="2584"/>
-          <a:stretch/>
-        </p:blipFill>
-        <p:spPr>
-          <a:xfrm>
-            <a:off x="149805" y="2564606"/>
-            <a:ext cx="11892389" cy="1728788"/>
-          </a:xfrm>
-          <a:prstGeom prst="rect">
-            <a:avLst/>
-          </a:prstGeom>
-        </p:spPr>
-      </p:pic>
-      <p:sp>
-        <p:nvSpPr>
-          <p:cNvPr id="11" name="TextBox 10">
-            <a:extLst>
-              <a:ext uri="{FF2B5EF4-FFF2-40B4-BE49-F238E27FC236}">
-                <a16:creationId xmlns:a16="http://schemas.microsoft.com/office/drawing/2014/main" id="{5DD3647C-2C60-4E18-95B9-0B4CFA3C2068}"/>
-              </a:ext>
-            </a:extLst>
-          </p:cNvPr>
-          <p:cNvSpPr txBox="1"/>
-          <p:nvPr/>
-        </p:nvSpPr>
-        <p:spPr>
-          <a:xfrm>
-            <a:off x="2085975" y="4500563"/>
-            <a:ext cx="7431201" cy="369332"/>
-          </a:xfrm>
-          <a:prstGeom prst="rect">
-            <a:avLst/>
-          </a:prstGeom>
-          <a:noFill/>
-        </p:spPr>
-        <p:txBody>
-          <a:bodyPr wrap="none" rtlCol="0">
-            <a:spAutoFit/>
-          </a:bodyPr>
-          <a:lstStyle/>
-          <a:p>
-            <a:r>
-              <a:rPr lang="en-US" dirty="0"/>
-              <a:t>Three open source </a:t>
-            </a:r>
-            <a:r>
-              <a:rPr lang="en-US" dirty="0" err="1"/>
-              <a:t>w.s</a:t>
-            </a:r>
-            <a:r>
-              <a:rPr lang="en-US" dirty="0"/>
-              <a:t>. chosen for experimental evaluation of the method [9]</a:t>
-            </a:r>
-          </a:p>
-        </p:txBody>
-      </p:sp>
-    </p:spTree>
-    <p:extLst>
-      <p:ext uri="{BB962C8B-B14F-4D97-AF65-F5344CB8AC3E}">
-        <p14:creationId xmlns:p14="http://schemas.microsoft.com/office/powerpoint/2010/main" val="3950552121"/>
-      </p:ext>
-    </p:extLst>
-  </p:cSld>
-  <p:clrMapOvr>
-    <a:masterClrMapping/>
-  </p:clrMapOvr>
-  <mc:AlternateContent xmlns:mc="http://schemas.openxmlformats.org/markup-compatibility/2006" xmlns:p14="http://schemas.microsoft.com/office/powerpoint/2010/main">
-    <mc:Choice Requires="p14">
-      <p:transition p14:dur="10"/>
-    </mc:Choice>
-    <mc:Fallback xmlns="">
-      <p:transition/>
-    </mc:Fallback>
-  </mc:AlternateContent>
-</p:sld>
-</file>
-
-<file path=ppt/slides/slide31.xml><?xml version="1.0" encoding="utf-8"?>
-<p:sld xmlns:a="http://schemas.openxmlformats.org/drawingml/2006/main" xmlns:r="http://schemas.openxmlformats.org/officeDocument/2006/relationships" xmlns:p="http://schemas.openxmlformats.org/presentationml/2006/main">
-  <p:cSld>
-    <p:spTree>
-      <p:nvGrpSpPr>
-        <p:cNvPr id="1" name=""/>
-        <p:cNvGrpSpPr/>
-        <p:nvPr/>
-      </p:nvGrpSpPr>
-      <p:grpSpPr>
-        <a:xfrm>
-          <a:off x="0" y="0"/>
-          <a:ext cx="0" cy="0"/>
-          <a:chOff x="0" y="0"/>
-          <a:chExt cx="0" cy="0"/>
-        </a:xfrm>
-      </p:grpSpPr>
-      <p:sp>
-        <p:nvSpPr>
-          <p:cNvPr id="2" name="Title 1"/>
-          <p:cNvSpPr>
-            <a:spLocks noGrp="1"/>
-          </p:cNvSpPr>
-          <p:nvPr>
-            <p:ph type="title"/>
-          </p:nvPr>
-        </p:nvSpPr>
-        <p:spPr>
-          <a:xfrm>
-            <a:off x="609600" y="266700"/>
-            <a:ext cx="10972800" cy="1066800"/>
-          </a:xfrm>
-        </p:spPr>
-        <p:txBody>
-          <a:bodyPr>
-            <a:normAutofit/>
-          </a:bodyPr>
-          <a:lstStyle/>
-          <a:p>
-            <a:r>
-              <a:rPr lang="en-US" dirty="0">
-                <a:solidFill>
-                  <a:srgbClr val="002E8A"/>
-                </a:solidFill>
-              </a:rPr>
-              <a:t>RESTful API automated test case generation[9]</a:t>
-            </a:r>
-          </a:p>
-        </p:txBody>
-      </p:sp>
       <p:sp>
         <p:nvSpPr>
           <p:cNvPr id="11" name="TextBox 10">
@@ -23544,7 +23341,7 @@
 </p:sld>
 </file>
 
-<file path=ppt/slides/slide32.xml><?xml version="1.0" encoding="utf-8"?>
+<file path=ppt/slides/slide31.xml><?xml version="1.0" encoding="utf-8"?>
 <p:sld xmlns:a="http://schemas.openxmlformats.org/drawingml/2006/main" xmlns:r="http://schemas.openxmlformats.org/officeDocument/2006/relationships" xmlns:p="http://schemas.openxmlformats.org/presentationml/2006/main">
   <p:cSld>
     <p:spTree>
@@ -23691,7 +23488,7 @@
 </p:sld>
 </file>
 
-<file path=ppt/slides/slide33.xml><?xml version="1.0" encoding="utf-8"?>
+<file path=ppt/slides/slide32.xml><?xml version="1.0" encoding="utf-8"?>
 <p:sld xmlns:a="http://schemas.openxmlformats.org/drawingml/2006/main" xmlns:r="http://schemas.openxmlformats.org/officeDocument/2006/relationships" xmlns:p="http://schemas.openxmlformats.org/presentationml/2006/main">
   <p:cSld>
     <p:spTree>
@@ -24525,7 +24322,7 @@
 </p:sld>
 </file>
 
-<file path=ppt/slides/slide34.xml><?xml version="1.0" encoding="utf-8"?>
+<file path=ppt/slides/slide33.xml><?xml version="1.0" encoding="utf-8"?>
 <p:sld xmlns:a="http://schemas.openxmlformats.org/drawingml/2006/main" xmlns:r="http://schemas.openxmlformats.org/officeDocument/2006/relationships" xmlns:p="http://schemas.openxmlformats.org/presentationml/2006/main">
   <p:cSld>
     <p:spTree>
@@ -24672,6 +24469,158 @@
 </p:sld>
 </file>
 
+<file path=ppt/slides/slide34.xml><?xml version="1.0" encoding="utf-8"?>
+<p:sld xmlns:a="http://schemas.openxmlformats.org/drawingml/2006/main" xmlns:r="http://schemas.openxmlformats.org/officeDocument/2006/relationships" xmlns:p="http://schemas.openxmlformats.org/presentationml/2006/main">
+  <p:cSld>
+    <p:spTree>
+      <p:nvGrpSpPr>
+        <p:cNvPr id="1" name=""/>
+        <p:cNvGrpSpPr/>
+        <p:nvPr/>
+      </p:nvGrpSpPr>
+      <p:grpSpPr>
+        <a:xfrm>
+          <a:off x="0" y="0"/>
+          <a:ext cx="0" cy="0"/>
+          <a:chOff x="0" y="0"/>
+          <a:chExt cx="0" cy="0"/>
+        </a:xfrm>
+      </p:grpSpPr>
+      <p:sp>
+        <p:nvSpPr>
+          <p:cNvPr id="2" name="Title 1"/>
+          <p:cNvSpPr>
+            <a:spLocks noGrp="1"/>
+          </p:cNvSpPr>
+          <p:nvPr>
+            <p:ph type="title"/>
+          </p:nvPr>
+        </p:nvSpPr>
+        <p:spPr>
+          <a:xfrm>
+            <a:off x="609600" y="266700"/>
+            <a:ext cx="10972800" cy="1066800"/>
+          </a:xfrm>
+        </p:spPr>
+        <p:txBody>
+          <a:bodyPr/>
+          <a:lstStyle/>
+          <a:p>
+            <a:r>
+              <a:rPr lang="tr-TR" dirty="0">
+                <a:solidFill>
+                  <a:srgbClr val="002E8A"/>
+                </a:solidFill>
+              </a:rPr>
+              <a:t>Conclusion</a:t>
+            </a:r>
+            <a:endParaRPr lang="en-US" dirty="0">
+              <a:solidFill>
+                <a:srgbClr val="002E8A"/>
+              </a:solidFill>
+            </a:endParaRPr>
+          </a:p>
+        </p:txBody>
+      </p:sp>
+      <p:sp>
+        <p:nvSpPr>
+          <p:cNvPr id="15" name="Content Placeholder 14"/>
+          <p:cNvSpPr>
+            <a:spLocks noGrp="1"/>
+          </p:cNvSpPr>
+          <p:nvPr>
+            <p:ph idx="1"/>
+          </p:nvPr>
+        </p:nvSpPr>
+        <p:spPr>
+          <a:xfrm>
+            <a:off x="609600" y="1597671"/>
+            <a:ext cx="10972800" cy="4958112"/>
+          </a:xfrm>
+        </p:spPr>
+        <p:txBody>
+          <a:bodyPr>
+            <a:normAutofit/>
+          </a:bodyPr>
+          <a:lstStyle/>
+          <a:p>
+            <a:r>
+              <a:rPr lang="fi-FI" dirty="0"/>
+              <a:t>There is no one size-fits ALL solution</a:t>
+            </a:r>
+          </a:p>
+          <a:p>
+            <a:r>
+              <a:rPr lang="fi-FI" dirty="0"/>
+              <a:t>Most of the evaluation of the testing systems are lacking</a:t>
+            </a:r>
+          </a:p>
+          <a:p>
+            <a:r>
+              <a:rPr lang="fi-FI" dirty="0"/>
+              <a:t>More standard way is needed!</a:t>
+            </a:r>
+          </a:p>
+          <a:p>
+            <a:pPr lvl="1"/>
+            <a:r>
+              <a:rPr lang="fi-FI" dirty="0"/>
+              <a:t>Common test bed services as a benchmark</a:t>
+            </a:r>
+          </a:p>
+          <a:p>
+            <a:pPr lvl="1"/>
+            <a:r>
+              <a:rPr lang="fi-FI" dirty="0"/>
+              <a:t>Performance measurements</a:t>
+            </a:r>
+          </a:p>
+          <a:p>
+            <a:pPr lvl="1"/>
+            <a:r>
+              <a:rPr lang="fi-FI" dirty="0"/>
+              <a:t>Open source it!</a:t>
+            </a:r>
+          </a:p>
+          <a:p>
+            <a:pPr lvl="1"/>
+            <a:r>
+              <a:rPr lang="fi-FI" dirty="0"/>
+              <a:t>Do not re-invent the wheel, try to use open source applications and build on top of it e.g. SOAPUI</a:t>
+            </a:r>
+          </a:p>
+          <a:p>
+            <a:r>
+              <a:rPr lang="fi-FI" dirty="0"/>
+              <a:t>Machine learning gets in use, which will lead to new research directions</a:t>
+            </a:r>
+          </a:p>
+          <a:p>
+            <a:endParaRPr lang="tr-TR" dirty="0"/>
+          </a:p>
+        </p:txBody>
+      </p:sp>
+    </p:spTree>
+    <p:extLst>
+      <p:ext uri="{BB962C8B-B14F-4D97-AF65-F5344CB8AC3E}">
+        <p14:creationId xmlns:p14="http://schemas.microsoft.com/office/powerpoint/2010/main" val="656376273"/>
+      </p:ext>
+    </p:extLst>
+  </p:cSld>
+  <p:clrMapOvr>
+    <a:masterClrMapping/>
+  </p:clrMapOvr>
+  <mc:AlternateContent xmlns:mc="http://schemas.openxmlformats.org/markup-compatibility/2006" xmlns:p14="http://schemas.microsoft.com/office/powerpoint/2010/main">
+    <mc:Choice Requires="p14">
+      <p:transition p14:dur="10"/>
+    </mc:Choice>
+    <mc:Fallback xmlns="">
+      <p:transition/>
+    </mc:Fallback>
+  </mc:AlternateContent>
+</p:sld>
+</file>
+
 <file path=ppt/slides/slide35.xml><?xml version="1.0" encoding="utf-8"?>
 <p:sld xmlns:a="http://schemas.openxmlformats.org/drawingml/2006/main" xmlns:r="http://schemas.openxmlformats.org/officeDocument/2006/relationships" xmlns:p="http://schemas.openxmlformats.org/presentationml/2006/main">
   <p:cSld>
@@ -24696,49 +24645,13 @@
             <a:spLocks noGrp="1"/>
           </p:cNvSpPr>
           <p:nvPr>
-            <p:ph type="title"/>
+            <p:ph type="title" idx="4294967295"/>
           </p:nvPr>
         </p:nvSpPr>
         <p:spPr>
           <a:xfrm>
-            <a:off x="609600" y="266700"/>
-            <a:ext cx="10972800" cy="1066800"/>
-          </a:xfrm>
-        </p:spPr>
-        <p:txBody>
-          <a:bodyPr/>
-          <a:lstStyle/>
-          <a:p>
-            <a:r>
-              <a:rPr lang="tr-TR" dirty="0">
-                <a:solidFill>
-                  <a:srgbClr val="002E8A"/>
-                </a:solidFill>
-              </a:rPr>
-              <a:t>Conclusion</a:t>
-            </a:r>
-            <a:endParaRPr lang="en-US" dirty="0">
-              <a:solidFill>
-                <a:srgbClr val="002E8A"/>
-              </a:solidFill>
-            </a:endParaRPr>
-          </a:p>
-        </p:txBody>
-      </p:sp>
-      <p:sp>
-        <p:nvSpPr>
-          <p:cNvPr id="15" name="Content Placeholder 14"/>
-          <p:cNvSpPr>
-            <a:spLocks noGrp="1"/>
-          </p:cNvSpPr>
-          <p:nvPr>
-            <p:ph idx="1"/>
-          </p:nvPr>
-        </p:nvSpPr>
-        <p:spPr>
-          <a:xfrm>
-            <a:off x="609600" y="1597671"/>
-            <a:ext cx="10972800" cy="4958112"/>
+            <a:off x="3774829" y="1497625"/>
+            <a:ext cx="4182209" cy="1066800"/>
           </a:xfrm>
         </p:spPr>
         <p:txBody>
@@ -24748,65 +24661,79 @@
           <a:lstStyle/>
           <a:p>
             <a:r>
-              <a:rPr lang="fi-FI" dirty="0"/>
-              <a:t>There is no one size-fits ALL solution</a:t>
-            </a:r>
-          </a:p>
-          <a:p>
-            <a:r>
-              <a:rPr lang="fi-FI" dirty="0"/>
-              <a:t>Most of the evaluation of the testing systems are lacking</a:t>
-            </a:r>
-          </a:p>
-          <a:p>
-            <a:r>
-              <a:rPr lang="fi-FI" dirty="0"/>
-              <a:t>More standard way is needed!</a:t>
-            </a:r>
-          </a:p>
-          <a:p>
-            <a:pPr lvl="1"/>
-            <a:r>
-              <a:rPr lang="fi-FI" dirty="0"/>
-              <a:t>Common test bed services as a benchmark</a:t>
-            </a:r>
-          </a:p>
-          <a:p>
-            <a:pPr lvl="1"/>
-            <a:r>
-              <a:rPr lang="fi-FI" dirty="0"/>
-              <a:t>Performance measurements</a:t>
-            </a:r>
-          </a:p>
-          <a:p>
-            <a:pPr lvl="1"/>
-            <a:r>
-              <a:rPr lang="fi-FI" dirty="0"/>
-              <a:t>Open source it!</a:t>
-            </a:r>
-          </a:p>
-          <a:p>
-            <a:pPr lvl="1"/>
-            <a:r>
-              <a:rPr lang="fi-FI" dirty="0"/>
-              <a:t>Do not re-invent the wheel, try to use open source applications and build on top of it e.g. SOAPUI</a:t>
-            </a:r>
-          </a:p>
-          <a:p>
-            <a:r>
-              <a:rPr lang="fi-FI" dirty="0"/>
-              <a:t>Machine learning gets in use, which will lead to new research directions</a:t>
-            </a:r>
-          </a:p>
-          <a:p>
-            <a:endParaRPr lang="tr-TR" dirty="0"/>
+              <a:rPr lang="tr-TR" sz="3200" dirty="0">
+                <a:solidFill>
+                  <a:srgbClr val="002E8A"/>
+                </a:solidFill>
+              </a:rPr>
+              <a:t>Thank you for listening!</a:t>
+            </a:r>
+            <a:endParaRPr lang="en-US" sz="3200" dirty="0">
+              <a:solidFill>
+                <a:srgbClr val="002E8A"/>
+              </a:solidFill>
+            </a:endParaRPr>
+          </a:p>
+        </p:txBody>
+      </p:sp>
+      <p:sp>
+        <p:nvSpPr>
+          <p:cNvPr id="4" name="Title 1"/>
+          <p:cNvSpPr txBox="1">
+            <a:spLocks/>
+          </p:cNvSpPr>
+          <p:nvPr/>
+        </p:nvSpPr>
+        <p:spPr>
+          <a:xfrm>
+            <a:off x="4530969" y="2713891"/>
+            <a:ext cx="2529255" cy="1066800"/>
+          </a:xfrm>
+          <a:prstGeom prst="rect">
+            <a:avLst/>
+          </a:prstGeom>
+        </p:spPr>
+        <p:txBody>
+          <a:bodyPr vert="horz" anchor="ctr">
+            <a:normAutofit/>
+          </a:bodyPr>
+          <a:lstStyle>
+            <a:lvl1pPr algn="l" rtl="0" eaLnBrk="1" latinLnBrk="0" hangingPunct="1">
+              <a:spcBef>
+                <a:spcPct val="0"/>
+              </a:spcBef>
+              <a:buNone/>
+              <a:defRPr kumimoji="0" sz="4000" kern="1200">
+                <a:solidFill>
+                  <a:schemeClr val="tx2"/>
+                </a:solidFill>
+                <a:latin typeface="+mj-lt"/>
+                <a:ea typeface="+mj-ea"/>
+                <a:cs typeface="+mj-cs"/>
+              </a:defRPr>
+            </a:lvl1pPr>
+          </a:lstStyle>
+          <a:p>
+            <a:r>
+              <a:rPr lang="tr-TR" dirty="0">
+                <a:solidFill>
+                  <a:schemeClr val="tx1"/>
+                </a:solidFill>
+              </a:rPr>
+              <a:t>Questions?</a:t>
+            </a:r>
+            <a:endParaRPr lang="en-US" dirty="0">
+              <a:solidFill>
+                <a:schemeClr val="tx1"/>
+              </a:solidFill>
+            </a:endParaRPr>
           </a:p>
         </p:txBody>
       </p:sp>
     </p:spTree>
     <p:extLst>
       <p:ext uri="{BB962C8B-B14F-4D97-AF65-F5344CB8AC3E}">
-        <p14:creationId xmlns:p14="http://schemas.microsoft.com/office/powerpoint/2010/main" val="656376273"/>
+        <p14:creationId xmlns:p14="http://schemas.microsoft.com/office/powerpoint/2010/main" val="2091042620"/>
       </p:ext>
     </p:extLst>
   </p:cSld>
@@ -24843,136 +24770,6 @@
       </p:grpSpPr>
       <p:sp>
         <p:nvSpPr>
-          <p:cNvPr id="2" name="Title 1"/>
-          <p:cNvSpPr>
-            <a:spLocks noGrp="1"/>
-          </p:cNvSpPr>
-          <p:nvPr>
-            <p:ph type="title" idx="4294967295"/>
-          </p:nvPr>
-        </p:nvSpPr>
-        <p:spPr>
-          <a:xfrm>
-            <a:off x="3774829" y="1497625"/>
-            <a:ext cx="4182209" cy="1066800"/>
-          </a:xfrm>
-        </p:spPr>
-        <p:txBody>
-          <a:bodyPr>
-            <a:normAutofit/>
-          </a:bodyPr>
-          <a:lstStyle/>
-          <a:p>
-            <a:r>
-              <a:rPr lang="tr-TR" sz="3200" dirty="0">
-                <a:solidFill>
-                  <a:srgbClr val="002E8A"/>
-                </a:solidFill>
-              </a:rPr>
-              <a:t>Thank you for listening!</a:t>
-            </a:r>
-            <a:endParaRPr lang="en-US" sz="3200" dirty="0">
-              <a:solidFill>
-                <a:srgbClr val="002E8A"/>
-              </a:solidFill>
-            </a:endParaRPr>
-          </a:p>
-        </p:txBody>
-      </p:sp>
-      <p:sp>
-        <p:nvSpPr>
-          <p:cNvPr id="4" name="Title 1"/>
-          <p:cNvSpPr txBox="1">
-            <a:spLocks/>
-          </p:cNvSpPr>
-          <p:nvPr/>
-        </p:nvSpPr>
-        <p:spPr>
-          <a:xfrm>
-            <a:off x="4530969" y="2713891"/>
-            <a:ext cx="2529255" cy="1066800"/>
-          </a:xfrm>
-          <a:prstGeom prst="rect">
-            <a:avLst/>
-          </a:prstGeom>
-        </p:spPr>
-        <p:txBody>
-          <a:bodyPr vert="horz" anchor="ctr">
-            <a:normAutofit/>
-          </a:bodyPr>
-          <a:lstStyle>
-            <a:lvl1pPr algn="l" rtl="0" eaLnBrk="1" latinLnBrk="0" hangingPunct="1">
-              <a:spcBef>
-                <a:spcPct val="0"/>
-              </a:spcBef>
-              <a:buNone/>
-              <a:defRPr kumimoji="0" sz="4000" kern="1200">
-                <a:solidFill>
-                  <a:schemeClr val="tx2"/>
-                </a:solidFill>
-                <a:latin typeface="+mj-lt"/>
-                <a:ea typeface="+mj-ea"/>
-                <a:cs typeface="+mj-cs"/>
-              </a:defRPr>
-            </a:lvl1pPr>
-          </a:lstStyle>
-          <a:p>
-            <a:r>
-              <a:rPr lang="tr-TR" dirty="0">
-                <a:solidFill>
-                  <a:schemeClr val="tx1"/>
-                </a:solidFill>
-              </a:rPr>
-              <a:t>Questions?</a:t>
-            </a:r>
-            <a:endParaRPr lang="en-US" dirty="0">
-              <a:solidFill>
-                <a:schemeClr val="tx1"/>
-              </a:solidFill>
-            </a:endParaRPr>
-          </a:p>
-        </p:txBody>
-      </p:sp>
-    </p:spTree>
-    <p:extLst>
-      <p:ext uri="{BB962C8B-B14F-4D97-AF65-F5344CB8AC3E}">
-        <p14:creationId xmlns:p14="http://schemas.microsoft.com/office/powerpoint/2010/main" val="2091042620"/>
-      </p:ext>
-    </p:extLst>
-  </p:cSld>
-  <p:clrMapOvr>
-    <a:masterClrMapping/>
-  </p:clrMapOvr>
-  <mc:AlternateContent xmlns:mc="http://schemas.openxmlformats.org/markup-compatibility/2006" xmlns:p14="http://schemas.microsoft.com/office/powerpoint/2010/main">
-    <mc:Choice Requires="p14">
-      <p:transition p14:dur="10"/>
-    </mc:Choice>
-    <mc:Fallback xmlns="">
-      <p:transition/>
-    </mc:Fallback>
-  </mc:AlternateContent>
-</p:sld>
-</file>
-
-<file path=ppt/slides/slide37.xml><?xml version="1.0" encoding="utf-8"?>
-<p:sld xmlns:a="http://schemas.openxmlformats.org/drawingml/2006/main" xmlns:r="http://schemas.openxmlformats.org/officeDocument/2006/relationships" xmlns:p="http://schemas.openxmlformats.org/presentationml/2006/main">
-  <p:cSld>
-    <p:spTree>
-      <p:nvGrpSpPr>
-        <p:cNvPr id="1" name=""/>
-        <p:cNvGrpSpPr/>
-        <p:nvPr/>
-      </p:nvGrpSpPr>
-      <p:grpSpPr>
-        <a:xfrm>
-          <a:off x="0" y="0"/>
-          <a:ext cx="0" cy="0"/>
-          <a:chOff x="0" y="0"/>
-          <a:chExt cx="0" cy="0"/>
-        </a:xfrm>
-      </p:grpSpPr>
-      <p:sp>
-        <p:nvSpPr>
           <p:cNvPr id="3" name="Content Placeholder 2"/>
           <p:cNvSpPr>
             <a:spLocks noGrp="1"/>
@@ -25267,7 +25064,7 @@
 </p:sld>
 </file>
 
-<file path=ppt/slides/slide38.xml><?xml version="1.0" encoding="utf-8"?>
+<file path=ppt/slides/slide37.xml><?xml version="1.0" encoding="utf-8"?>
 <p:sld xmlns:a="http://schemas.openxmlformats.org/drawingml/2006/main" xmlns:r="http://schemas.openxmlformats.org/officeDocument/2006/relationships" xmlns:p="http://schemas.openxmlformats.org/presentationml/2006/main">
   <p:cSld>
     <p:spTree>
@@ -25537,7 +25334,7 @@
                   <a:schemeClr val="tx1"/>
                 </a:solidFill>
               </a:rPr>
-              <a:t>Canfora and Di Penta 2006</a:t>
+              <a:t>Canfora and Di Penta 2006 [2]</a:t>
             </a:r>
           </a:p>
           <a:p>

</xml_diff>